<commit_message>
Adde DLL in ppt
</commit_message>
<xml_diff>
--- a/Final_Presentation/draft_presentation.pptx
+++ b/Final_Presentation/draft_presentation.pptx
@@ -9,11 +9,16 @@
     <p:sldId id="258" r:id="rId3"/>
     <p:sldId id="257" r:id="rId4"/>
     <p:sldId id="260" r:id="rId5"/>
-    <p:sldId id="259" r:id="rId6"/>
-    <p:sldId id="261" r:id="rId7"/>
-    <p:sldId id="262" r:id="rId8"/>
-    <p:sldId id="263" r:id="rId9"/>
-    <p:sldId id="264" r:id="rId10"/>
+    <p:sldId id="265" r:id="rId6"/>
+    <p:sldId id="259" r:id="rId7"/>
+    <p:sldId id="266" r:id="rId8"/>
+    <p:sldId id="261" r:id="rId9"/>
+    <p:sldId id="262" r:id="rId10"/>
+    <p:sldId id="263" r:id="rId11"/>
+    <p:sldId id="264" r:id="rId12"/>
+    <p:sldId id="267" r:id="rId13"/>
+    <p:sldId id="268" r:id="rId14"/>
+    <p:sldId id="269" r:id="rId15"/>
   </p:sldIdLst>
   <p:sldSz cx="12192000" cy="6858000"/>
   <p:notesSz cx="6858000" cy="9144000"/>
@@ -112,7 +117,276 @@
       </a:defRPr>
     </a:lvl9pPr>
   </p:defaultTextStyle>
+  <p:extLst>
+    <p:ext uri="{EFAFB233-063F-42B5-8137-9DF3F51BA10A}">
+      <p15:sldGuideLst xmlns:p15="http://schemas.microsoft.com/office/powerpoint/2012/main"/>
+    </p:ext>
+  </p:extLst>
 </p:presentation>
+</file>
+
+<file path=ppt/changesInfos/changesInfo1.xml><?xml version="1.0" encoding="utf-8"?>
+<pc:chgInfo xmlns:a="http://schemas.openxmlformats.org/drawingml/2006/main" xmlns:r="http://schemas.openxmlformats.org/officeDocument/2006/relationships" xmlns:ac="http://schemas.microsoft.com/office/drawing/2013/main/command" xmlns:pc="http://schemas.microsoft.com/office/powerpoint/2013/main/command">
+  <pc:docChgLst>
+    <pc:chgData name="Aditya Priyadarshi" userId="77e3dce1717f3105" providerId="LiveId" clId="{B1D5EEBF-C571-4A0B-84AF-1F93F8160EFF}"/>
+    <pc:docChg chg="undo custSel addSld modSld">
+      <pc:chgData name="Aditya Priyadarshi" userId="77e3dce1717f3105" providerId="LiveId" clId="{B1D5EEBF-C571-4A0B-84AF-1F93F8160EFF}" dt="2017-12-13T05:32:53.263" v="1060" actId="20577"/>
+      <pc:docMkLst>
+        <pc:docMk/>
+      </pc:docMkLst>
+      <pc:sldChg chg="addSp delSp modSp mod setBg">
+        <pc:chgData name="Aditya Priyadarshi" userId="77e3dce1717f3105" providerId="LiveId" clId="{B1D5EEBF-C571-4A0B-84AF-1F93F8160EFF}" dt="2017-12-13T05:16:08.646" v="606" actId="1076"/>
+        <pc:sldMkLst>
+          <pc:docMk/>
+          <pc:sldMk cId="1561574345" sldId="259"/>
+        </pc:sldMkLst>
+        <pc:spChg chg="mod ord">
+          <ac:chgData name="Aditya Priyadarshi" userId="77e3dce1717f3105" providerId="LiveId" clId="{B1D5EEBF-C571-4A0B-84AF-1F93F8160EFF}" dt="2017-12-13T05:15:16.419" v="588" actId="1076"/>
+          <ac:spMkLst>
+            <pc:docMk/>
+            <pc:sldMk cId="1561574345" sldId="259"/>
+            <ac:spMk id="5" creationId="{00000000-0000-0000-0000-000000000000}"/>
+          </ac:spMkLst>
+        </pc:spChg>
+        <pc:spChg chg="add del mod ord">
+          <ac:chgData name="Aditya Priyadarshi" userId="77e3dce1717f3105" providerId="LiveId" clId="{B1D5EEBF-C571-4A0B-84AF-1F93F8160EFF}" dt="2017-12-13T05:16:08.646" v="606" actId="1076"/>
+          <ac:spMkLst>
+            <pc:docMk/>
+            <pc:sldMk cId="1561574345" sldId="259"/>
+            <ac:spMk id="6" creationId="{00000000-0000-0000-0000-000000000000}"/>
+          </ac:spMkLst>
+        </pc:spChg>
+        <pc:spChg chg="add del">
+          <ac:chgData name="Aditya Priyadarshi" userId="77e3dce1717f3105" providerId="LiveId" clId="{B1D5EEBF-C571-4A0B-84AF-1F93F8160EFF}" dt="2017-12-13T05:08:57.966" v="338" actId="26606"/>
+          <ac:spMkLst>
+            <pc:docMk/>
+            <pc:sldMk cId="1561574345" sldId="259"/>
+            <ac:spMk id="12" creationId="{C2CAC0E2-A334-4A65-B7FA-9BDDAD042CC6}"/>
+          </ac:spMkLst>
+        </pc:spChg>
+        <pc:picChg chg="add mod">
+          <ac:chgData name="Aditya Priyadarshi" userId="77e3dce1717f3105" providerId="LiveId" clId="{B1D5EEBF-C571-4A0B-84AF-1F93F8160EFF}" dt="2017-12-13T05:15:59.242" v="604" actId="14100"/>
+          <ac:picMkLst>
+            <pc:docMk/>
+            <pc:sldMk cId="1561574345" sldId="259"/>
+            <ac:picMk id="3" creationId="{974A4BF6-6710-4CD5-AEBB-4E04BC431CF3}"/>
+          </ac:picMkLst>
+        </pc:picChg>
+        <pc:picChg chg="add mod">
+          <ac:chgData name="Aditya Priyadarshi" userId="77e3dce1717f3105" providerId="LiveId" clId="{B1D5EEBF-C571-4A0B-84AF-1F93F8160EFF}" dt="2017-12-13T05:16:02.231" v="605" actId="14100"/>
+          <ac:picMkLst>
+            <pc:docMk/>
+            <pc:sldMk cId="1561574345" sldId="259"/>
+            <ac:picMk id="7" creationId="{3372DF14-1931-43AA-91BD-59A5B218EB62}"/>
+          </ac:picMkLst>
+        </pc:picChg>
+        <pc:picChg chg="del">
+          <ac:chgData name="Aditya Priyadarshi" userId="77e3dce1717f3105" providerId="LiveId" clId="{B1D5EEBF-C571-4A0B-84AF-1F93F8160EFF}" dt="2017-12-13T05:07:07.376" v="309" actId="478"/>
+          <ac:picMkLst>
+            <pc:docMk/>
+            <pc:sldMk cId="1561574345" sldId="259"/>
+            <ac:picMk id="8" creationId="{00000000-0000-0000-0000-000000000000}"/>
+          </ac:picMkLst>
+        </pc:picChg>
+        <pc:picChg chg="del">
+          <ac:chgData name="Aditya Priyadarshi" userId="77e3dce1717f3105" providerId="LiveId" clId="{B1D5EEBF-C571-4A0B-84AF-1F93F8160EFF}" dt="2017-12-13T05:07:09.253" v="310" actId="478"/>
+          <ac:picMkLst>
+            <pc:docMk/>
+            <pc:sldMk cId="1561574345" sldId="259"/>
+            <ac:picMk id="9" creationId="{00000000-0000-0000-0000-000000000000}"/>
+          </ac:picMkLst>
+        </pc:picChg>
+        <pc:picChg chg="add del mod">
+          <ac:chgData name="Aditya Priyadarshi" userId="77e3dce1717f3105" providerId="LiveId" clId="{B1D5EEBF-C571-4A0B-84AF-1F93F8160EFF}" dt="2017-12-13T05:11:35.772" v="388" actId="478"/>
+          <ac:picMkLst>
+            <pc:docMk/>
+            <pc:sldMk cId="1561574345" sldId="259"/>
+            <ac:picMk id="11" creationId="{763B8EFC-9172-4EB3-A7E5-108804D8FE62}"/>
+          </ac:picMkLst>
+        </pc:picChg>
+        <pc:picChg chg="add del mod">
+          <ac:chgData name="Aditya Priyadarshi" userId="77e3dce1717f3105" providerId="LiveId" clId="{B1D5EEBF-C571-4A0B-84AF-1F93F8160EFF}" dt="2017-12-13T05:11:34.219" v="387" actId="478"/>
+          <ac:picMkLst>
+            <pc:docMk/>
+            <pc:sldMk cId="1561574345" sldId="259"/>
+            <ac:picMk id="14" creationId="{696335A9-8529-4842-A712-B91642C8F548}"/>
+          </ac:picMkLst>
+        </pc:picChg>
+      </pc:sldChg>
+      <pc:sldChg chg="modSp add">
+        <pc:chgData name="Aditya Priyadarshi" userId="77e3dce1717f3105" providerId="LiveId" clId="{B1D5EEBF-C571-4A0B-84AF-1F93F8160EFF}" dt="2017-12-13T05:00:41.701" v="307" actId="20577"/>
+        <pc:sldMkLst>
+          <pc:docMk/>
+          <pc:sldMk cId="1634841487" sldId="265"/>
+        </pc:sldMkLst>
+        <pc:spChg chg="mod">
+          <ac:chgData name="Aditya Priyadarshi" userId="77e3dce1717f3105" providerId="LiveId" clId="{B1D5EEBF-C571-4A0B-84AF-1F93F8160EFF}" dt="2017-12-13T04:56:29.578" v="27" actId="20577"/>
+          <ac:spMkLst>
+            <pc:docMk/>
+            <pc:sldMk cId="1634841487" sldId="265"/>
+            <ac:spMk id="2" creationId="{64328DD1-FC2A-4501-991C-B997205E885B}"/>
+          </ac:spMkLst>
+        </pc:spChg>
+        <pc:spChg chg="mod">
+          <ac:chgData name="Aditya Priyadarshi" userId="77e3dce1717f3105" providerId="LiveId" clId="{B1D5EEBF-C571-4A0B-84AF-1F93F8160EFF}" dt="2017-12-13T05:00:41.701" v="307" actId="20577"/>
+          <ac:spMkLst>
+            <pc:docMk/>
+            <pc:sldMk cId="1634841487" sldId="265"/>
+            <ac:spMk id="3" creationId="{E5801039-0831-46C3-BBC4-8A94ADD5C881}"/>
+          </ac:spMkLst>
+        </pc:spChg>
+      </pc:sldChg>
+      <pc:sldChg chg="modSp add">
+        <pc:chgData name="Aditya Priyadarshi" userId="77e3dce1717f3105" providerId="LiveId" clId="{B1D5EEBF-C571-4A0B-84AF-1F93F8160EFF}" dt="2017-12-13T05:15:52.005" v="603" actId="1076"/>
+        <pc:sldMkLst>
+          <pc:docMk/>
+          <pc:sldMk cId="1282364818" sldId="266"/>
+        </pc:sldMkLst>
+        <pc:spChg chg="mod">
+          <ac:chgData name="Aditya Priyadarshi" userId="77e3dce1717f3105" providerId="LiveId" clId="{B1D5EEBF-C571-4A0B-84AF-1F93F8160EFF}" dt="2017-12-13T05:15:41.445" v="601" actId="1076"/>
+          <ac:spMkLst>
+            <pc:docMk/>
+            <pc:sldMk cId="1282364818" sldId="266"/>
+            <ac:spMk id="5" creationId="{00000000-0000-0000-0000-000000000000}"/>
+          </ac:spMkLst>
+        </pc:spChg>
+        <pc:spChg chg="mod">
+          <ac:chgData name="Aditya Priyadarshi" userId="77e3dce1717f3105" providerId="LiveId" clId="{B1D5EEBF-C571-4A0B-84AF-1F93F8160EFF}" dt="2017-12-13T05:15:43.690" v="602" actId="1076"/>
+          <ac:spMkLst>
+            <pc:docMk/>
+            <pc:sldMk cId="1282364818" sldId="266"/>
+            <ac:spMk id="6" creationId="{00000000-0000-0000-0000-000000000000}"/>
+          </ac:spMkLst>
+        </pc:spChg>
+        <pc:picChg chg="mod">
+          <ac:chgData name="Aditya Priyadarshi" userId="77e3dce1717f3105" providerId="LiveId" clId="{B1D5EEBF-C571-4A0B-84AF-1F93F8160EFF}" dt="2017-12-13T05:15:41.030" v="600" actId="1076"/>
+          <ac:picMkLst>
+            <pc:docMk/>
+            <pc:sldMk cId="1282364818" sldId="266"/>
+            <ac:picMk id="8" creationId="{00000000-0000-0000-0000-000000000000}"/>
+          </ac:picMkLst>
+        </pc:picChg>
+        <pc:picChg chg="mod">
+          <ac:chgData name="Aditya Priyadarshi" userId="77e3dce1717f3105" providerId="LiveId" clId="{B1D5EEBF-C571-4A0B-84AF-1F93F8160EFF}" dt="2017-12-13T05:15:52.005" v="603" actId="1076"/>
+          <ac:picMkLst>
+            <pc:docMk/>
+            <pc:sldMk cId="1282364818" sldId="266"/>
+            <ac:picMk id="9" creationId="{00000000-0000-0000-0000-000000000000}"/>
+          </ac:picMkLst>
+        </pc:picChg>
+      </pc:sldChg>
+      <pc:sldChg chg="addSp delSp modSp add">
+        <pc:chgData name="Aditya Priyadarshi" userId="77e3dce1717f3105" providerId="LiveId" clId="{B1D5EEBF-C571-4A0B-84AF-1F93F8160EFF}" dt="2017-12-13T05:26:39.160" v="796" actId="14100"/>
+        <pc:sldMkLst>
+          <pc:docMk/>
+          <pc:sldMk cId="1963870073" sldId="267"/>
+        </pc:sldMkLst>
+        <pc:spChg chg="mod">
+          <ac:chgData name="Aditya Priyadarshi" userId="77e3dce1717f3105" providerId="LiveId" clId="{B1D5EEBF-C571-4A0B-84AF-1F93F8160EFF}" dt="2017-12-13T05:17:24.786" v="639" actId="20577"/>
+          <ac:spMkLst>
+            <pc:docMk/>
+            <pc:sldMk cId="1963870073" sldId="267"/>
+            <ac:spMk id="2" creationId="{B5B988DD-3CEA-4306-9333-C8B9309F3C73}"/>
+          </ac:spMkLst>
+        </pc:spChg>
+        <pc:spChg chg="mod">
+          <ac:chgData name="Aditya Priyadarshi" userId="77e3dce1717f3105" providerId="LiveId" clId="{B1D5EEBF-C571-4A0B-84AF-1F93F8160EFF}" dt="2017-12-13T05:25:06.429" v="790" actId="20577"/>
+          <ac:spMkLst>
+            <pc:docMk/>
+            <pc:sldMk cId="1963870073" sldId="267"/>
+            <ac:spMk id="3" creationId="{E629C9F5-B61D-4EEA-ABF2-D845038A52CF}"/>
+          </ac:spMkLst>
+        </pc:spChg>
+        <pc:spChg chg="del">
+          <ac:chgData name="Aditya Priyadarshi" userId="77e3dce1717f3105" providerId="LiveId" clId="{B1D5EEBF-C571-4A0B-84AF-1F93F8160EFF}" dt="2017-12-13T05:17:14.945" v="636" actId="478"/>
+          <ac:spMkLst>
+            <pc:docMk/>
+            <pc:sldMk cId="1963870073" sldId="267"/>
+            <ac:spMk id="4" creationId="{B621EFA1-761A-4B20-82AD-C71391484213}"/>
+          </ac:spMkLst>
+        </pc:spChg>
+        <pc:picChg chg="add mod">
+          <ac:chgData name="Aditya Priyadarshi" userId="77e3dce1717f3105" providerId="LiveId" clId="{B1D5EEBF-C571-4A0B-84AF-1F93F8160EFF}" dt="2017-12-13T05:26:39.160" v="796" actId="14100"/>
+          <ac:picMkLst>
+            <pc:docMk/>
+            <pc:sldMk cId="1963870073" sldId="267"/>
+            <ac:picMk id="6" creationId="{F4F9CB59-64AC-4445-AEB9-F9F8ADE9EAFC}"/>
+          </ac:picMkLst>
+        </pc:picChg>
+      </pc:sldChg>
+      <pc:sldChg chg="addSp delSp modSp add mod setBg">
+        <pc:chgData name="Aditya Priyadarshi" userId="77e3dce1717f3105" providerId="LiveId" clId="{B1D5EEBF-C571-4A0B-84AF-1F93F8160EFF}" dt="2017-12-13T05:29:00.625" v="826" actId="1076"/>
+        <pc:sldMkLst>
+          <pc:docMk/>
+          <pc:sldMk cId="482401313" sldId="268"/>
+        </pc:sldMkLst>
+        <pc:spChg chg="mod ord">
+          <ac:chgData name="Aditya Priyadarshi" userId="77e3dce1717f3105" providerId="LiveId" clId="{B1D5EEBF-C571-4A0B-84AF-1F93F8160EFF}" dt="2017-12-13T05:29:00.625" v="826" actId="1076"/>
+          <ac:spMkLst>
+            <pc:docMk/>
+            <pc:sldMk cId="482401313" sldId="268"/>
+            <ac:spMk id="2" creationId="{8DDE080F-369D-45F0-AFC1-59F520CB0A99}"/>
+          </ac:spMkLst>
+        </pc:spChg>
+        <pc:spChg chg="del">
+          <ac:chgData name="Aditya Priyadarshi" userId="77e3dce1717f3105" providerId="LiveId" clId="{B1D5EEBF-C571-4A0B-84AF-1F93F8160EFF}" dt="2017-12-13T05:28:10.351" v="818"/>
+          <ac:spMkLst>
+            <pc:docMk/>
+            <pc:sldMk cId="482401313" sldId="268"/>
+            <ac:spMk id="3" creationId="{338DE6F5-6755-464A-BF4D-31C6A5CAB8D7}"/>
+          </ac:spMkLst>
+        </pc:spChg>
+        <pc:spChg chg="del">
+          <ac:chgData name="Aditya Priyadarshi" userId="77e3dce1717f3105" providerId="LiveId" clId="{B1D5EEBF-C571-4A0B-84AF-1F93F8160EFF}" dt="2017-12-13T05:28:03.269" v="817" actId="478"/>
+          <ac:spMkLst>
+            <pc:docMk/>
+            <pc:sldMk cId="482401313" sldId="268"/>
+            <ac:spMk id="4" creationId="{674C14BA-9AC5-448F-9DF8-2103F272856D}"/>
+          </ac:spMkLst>
+        </pc:spChg>
+        <pc:picChg chg="add mod">
+          <ac:chgData name="Aditya Priyadarshi" userId="77e3dce1717f3105" providerId="LiveId" clId="{B1D5EEBF-C571-4A0B-84AF-1F93F8160EFF}" dt="2017-12-13T05:28:47.107" v="824" actId="1076"/>
+          <ac:picMkLst>
+            <pc:docMk/>
+            <pc:sldMk cId="482401313" sldId="268"/>
+            <ac:picMk id="6" creationId="{2C3FC618-4A0F-4D6C-B3FB-3EBE29DEEC71}"/>
+          </ac:picMkLst>
+        </pc:picChg>
+      </pc:sldChg>
+      <pc:sldChg chg="delSp modSp add">
+        <pc:chgData name="Aditya Priyadarshi" userId="77e3dce1717f3105" providerId="LiveId" clId="{B1D5EEBF-C571-4A0B-84AF-1F93F8160EFF}" dt="2017-12-13T05:32:53.263" v="1060" actId="20577"/>
+        <pc:sldMkLst>
+          <pc:docMk/>
+          <pc:sldMk cId="3839082217" sldId="269"/>
+        </pc:sldMkLst>
+        <pc:spChg chg="mod">
+          <ac:chgData name="Aditya Priyadarshi" userId="77e3dce1717f3105" providerId="LiveId" clId="{B1D5EEBF-C571-4A0B-84AF-1F93F8160EFF}" dt="2017-12-13T05:32:53.263" v="1060" actId="20577"/>
+          <ac:spMkLst>
+            <pc:docMk/>
+            <pc:sldMk cId="3839082217" sldId="269"/>
+            <ac:spMk id="2" creationId="{2FD8CD52-7B04-44C1-81F8-F6083BC044BB}"/>
+          </ac:spMkLst>
+        </pc:spChg>
+        <pc:spChg chg="mod">
+          <ac:chgData name="Aditya Priyadarshi" userId="77e3dce1717f3105" providerId="LiveId" clId="{B1D5EEBF-C571-4A0B-84AF-1F93F8160EFF}" dt="2017-12-13T05:32:34.781" v="1047" actId="20577"/>
+          <ac:spMkLst>
+            <pc:docMk/>
+            <pc:sldMk cId="3839082217" sldId="269"/>
+            <ac:spMk id="3" creationId="{EF1E5ACD-A634-4E52-9F70-65709F9A6A6A}"/>
+          </ac:spMkLst>
+        </pc:spChg>
+        <pc:spChg chg="del">
+          <ac:chgData name="Aditya Priyadarshi" userId="77e3dce1717f3105" providerId="LiveId" clId="{B1D5EEBF-C571-4A0B-84AF-1F93F8160EFF}" dt="2017-12-13T05:29:26.771" v="848" actId="478"/>
+          <ac:spMkLst>
+            <pc:docMk/>
+            <pc:sldMk cId="3839082217" sldId="269"/>
+            <ac:spMk id="4" creationId="{6098472C-B8AB-4729-A728-E0EB99C0FB5E}"/>
+          </ac:spMkLst>
+        </pc:spChg>
+      </pc:sldChg>
+    </pc:docChg>
+  </pc:docChgLst>
+</pc:chgInfo>
 </file>
 
 <file path=ppt/slideLayouts/slideLayout1.xml><?xml version="1.0" encoding="utf-8"?>
@@ -174,7 +448,7 @@
           </a:lstStyle>
           <a:p>
             <a:r>
-              <a:rPr lang="en-US" smtClean="0"/>
+              <a:rPr lang="en-US"/>
               <a:t>Click to edit Master title style</a:t>
             </a:r>
             <a:endParaRPr lang="en-US" dirty="0"/>
@@ -304,7 +578,7 @@
           </a:lstStyle>
           <a:p>
             <a:r>
-              <a:rPr lang="en-US" smtClean="0"/>
+              <a:rPr lang="en-US"/>
               <a:t>Click to edit Master subtitle style</a:t>
             </a:r>
             <a:endParaRPr lang="en-US" dirty="0"/>
@@ -329,7 +603,7 @@
             <a:fld id="{B61BEF0D-F0BB-DE4B-95CE-6DB70DBA9567}" type="datetimeFigureOut">
               <a:rPr lang="en-US" dirty="0"/>
               <a:pPr/>
-              <a:t>12/12/17</a:t>
+              <a:t>12/12/2017</a:t>
             </a:fld>
             <a:endParaRPr lang="en-US" dirty="0"/>
           </a:p>
@@ -430,7 +704,7 @@
           </a:lstStyle>
           <a:p>
             <a:r>
-              <a:rPr lang="en-US" smtClean="0"/>
+              <a:rPr lang="en-US"/>
               <a:t>Click to edit Master title style</a:t>
             </a:r>
             <a:endParaRPr lang="en-US" dirty="0"/>
@@ -525,7 +799,7 @@
           </a:lstStyle>
           <a:p>
             <a:r>
-              <a:rPr lang="en-US" smtClean="0"/>
+              <a:rPr lang="en-US"/>
               <a:t>Drag picture to placeholder or click icon to add</a:t>
             </a:r>
             <a:endParaRPr lang="en-US" dirty="0"/>
@@ -593,7 +867,7 @@
           <a:p>
             <a:pPr lvl="0"/>
             <a:r>
-              <a:rPr lang="en-US" smtClean="0"/>
+              <a:rPr lang="en-US"/>
               <a:t>Click to edit Master text styles</a:t>
             </a:r>
           </a:p>
@@ -617,7 +891,7 @@
             <a:fld id="{B61BEF0D-F0BB-DE4B-95CE-6DB70DBA9567}" type="datetimeFigureOut">
               <a:rPr lang="en-US" dirty="0"/>
               <a:pPr/>
-              <a:t>12/12/17</a:t>
+              <a:t>12/12/2017</a:t>
             </a:fld>
             <a:endParaRPr lang="en-US" dirty="0"/>
           </a:p>
@@ -718,7 +992,7 @@
           </a:lstStyle>
           <a:p>
             <a:r>
-              <a:rPr lang="en-US" smtClean="0"/>
+              <a:rPr lang="en-US"/>
               <a:t>Click to edit Master title style</a:t>
             </a:r>
             <a:endParaRPr lang="en-US" dirty="0"/>
@@ -849,7 +1123,7 @@
           <a:p>
             <a:pPr lvl="0"/>
             <a:r>
-              <a:rPr lang="en-US" smtClean="0"/>
+              <a:rPr lang="en-US"/>
               <a:t>Click to edit Master text styles</a:t>
             </a:r>
           </a:p>
@@ -873,7 +1147,7 @@
             <a:fld id="{B61BEF0D-F0BB-DE4B-95CE-6DB70DBA9567}" type="datetimeFigureOut">
               <a:rPr lang="en-US" dirty="0"/>
               <a:pPr/>
-              <a:t>12/12/17</a:t>
+              <a:t>12/12/2017</a:t>
             </a:fld>
             <a:endParaRPr lang="en-US" dirty="0"/>
           </a:p>
@@ -1208,7 +1482,7 @@
           </a:lstStyle>
           <a:p>
             <a:r>
-              <a:rPr lang="en-US" smtClean="0"/>
+              <a:rPr lang="en-US"/>
               <a:t>Click to edit Master title style</a:t>
             </a:r>
             <a:endParaRPr lang="en-US" dirty="0"/>
@@ -1263,7 +1537,7 @@
           <a:p>
             <a:pPr lvl="0"/>
             <a:r>
-              <a:rPr lang="en-US" smtClean="0"/>
+              <a:rPr lang="en-US"/>
               <a:t>Click to edit Master text styles</a:t>
             </a:r>
           </a:p>
@@ -1315,7 +1589,7 @@
               <a:buNone/>
             </a:pPr>
             <a:r>
-              <a:rPr lang="en-US" smtClean="0"/>
+              <a:rPr lang="en-US"/>
               <a:t>Click to edit Master text styles</a:t>
             </a:r>
           </a:p>
@@ -1339,7 +1613,7 @@
             <a:fld id="{B61BEF0D-F0BB-DE4B-95CE-6DB70DBA9567}" type="datetimeFigureOut">
               <a:rPr lang="en-US" dirty="0"/>
               <a:pPr/>
-              <a:t>12/12/17</a:t>
+              <a:t>12/12/2017</a:t>
             </a:fld>
             <a:endParaRPr lang="en-US" dirty="0"/>
           </a:p>
@@ -1440,7 +1714,7 @@
           </a:lstStyle>
           <a:p>
             <a:r>
-              <a:rPr lang="en-US" smtClean="0"/>
+              <a:rPr lang="en-US"/>
               <a:t>Click to edit Master title style</a:t>
             </a:r>
             <a:endParaRPr lang="en-US" dirty="0"/>
@@ -1492,7 +1766,7 @@
               <a:buNone/>
             </a:pPr>
             <a:r>
-              <a:rPr lang="en-US" smtClean="0"/>
+              <a:rPr lang="en-US"/>
               <a:t>Click to edit Master text styles</a:t>
             </a:r>
           </a:p>
@@ -1516,7 +1790,7 @@
             <a:fld id="{B61BEF0D-F0BB-DE4B-95CE-6DB70DBA9567}" type="datetimeFigureOut">
               <a:rPr lang="en-US" dirty="0"/>
               <a:pPr/>
-              <a:t>12/12/17</a:t>
+              <a:t>12/12/2017</a:t>
             </a:fld>
             <a:endParaRPr lang="en-US" dirty="0"/>
           </a:p>
@@ -1862,7 +2136,7 @@
           </a:lstStyle>
           <a:p>
             <a:r>
-              <a:rPr lang="en-US" smtClean="0"/>
+              <a:rPr lang="en-US"/>
               <a:t>Click to edit Master title style</a:t>
             </a:r>
             <a:endParaRPr lang="en-US" dirty="0"/>
@@ -1935,7 +2209,7 @@
               <a:buNone/>
             </a:pPr>
             <a:r>
-              <a:rPr lang="en-US" smtClean="0"/>
+              <a:rPr lang="en-US"/>
               <a:t>Click to edit Master text styles</a:t>
             </a:r>
           </a:p>
@@ -2065,7 +2339,7 @@
           <a:p>
             <a:pPr lvl="0"/>
             <a:r>
-              <a:rPr lang="en-US" smtClean="0"/>
+              <a:rPr lang="en-US"/>
               <a:t>Click to edit Master text styles</a:t>
             </a:r>
           </a:p>
@@ -2089,7 +2363,7 @@
             <a:fld id="{B61BEF0D-F0BB-DE4B-95CE-6DB70DBA9567}" type="datetimeFigureOut">
               <a:rPr lang="en-US" dirty="0"/>
               <a:pPr/>
-              <a:t>12/12/17</a:t>
+              <a:t>12/12/2017</a:t>
             </a:fld>
             <a:endParaRPr lang="en-US" dirty="0"/>
           </a:p>
@@ -2191,7 +2465,7 @@
           <a:p>
             <a:pPr marL="0" lvl="0"/>
             <a:r>
-              <a:rPr lang="en-US" smtClean="0"/>
+              <a:rPr lang="en-US"/>
               <a:t>Click to edit Master title style</a:t>
             </a:r>
             <a:endParaRPr lang="en-US" dirty="0"/>
@@ -2264,7 +2538,7 @@
               <a:buNone/>
             </a:pPr>
             <a:r>
-              <a:rPr lang="en-US" smtClean="0"/>
+              <a:rPr lang="en-US"/>
               <a:t>Click to edit Master text styles</a:t>
             </a:r>
           </a:p>
@@ -2394,7 +2668,7 @@
           <a:p>
             <a:pPr lvl="0"/>
             <a:r>
-              <a:rPr lang="en-US" smtClean="0"/>
+              <a:rPr lang="en-US"/>
               <a:t>Click to edit Master text styles</a:t>
             </a:r>
           </a:p>
@@ -2418,7 +2692,7 @@
             <a:fld id="{B61BEF0D-F0BB-DE4B-95CE-6DB70DBA9567}" type="datetimeFigureOut">
               <a:rPr lang="en-US" dirty="0"/>
               <a:pPr/>
-              <a:t>12/12/17</a:t>
+              <a:t>12/12/2017</a:t>
             </a:fld>
             <a:endParaRPr lang="en-US" dirty="0"/>
           </a:p>
@@ -2513,7 +2787,7 @@
           <a:lstStyle/>
           <a:p>
             <a:r>
-              <a:rPr lang="en-US" smtClean="0"/>
+              <a:rPr lang="en-US"/>
               <a:t>Click to edit Master title style</a:t>
             </a:r>
             <a:endParaRPr lang="en-US" dirty="0"/>
@@ -2537,35 +2811,35 @@
           <a:p>
             <a:pPr lvl="0"/>
             <a:r>
-              <a:rPr lang="en-US" smtClean="0"/>
+              <a:rPr lang="en-US"/>
               <a:t>Click to edit Master text styles</a:t>
             </a:r>
           </a:p>
           <a:p>
             <a:pPr lvl="1"/>
             <a:r>
-              <a:rPr lang="en-US" smtClean="0"/>
+              <a:rPr lang="en-US"/>
               <a:t>Second level</a:t>
             </a:r>
           </a:p>
           <a:p>
             <a:pPr lvl="2"/>
             <a:r>
-              <a:rPr lang="en-US" smtClean="0"/>
+              <a:rPr lang="en-US"/>
               <a:t>Third level</a:t>
             </a:r>
           </a:p>
           <a:p>
             <a:pPr lvl="3"/>
             <a:r>
-              <a:rPr lang="en-US" smtClean="0"/>
+              <a:rPr lang="en-US"/>
               <a:t>Fourth level</a:t>
             </a:r>
           </a:p>
           <a:p>
             <a:pPr lvl="4"/>
             <a:r>
-              <a:rPr lang="en-US" smtClean="0"/>
+              <a:rPr lang="en-US"/>
               <a:t>Fifth level</a:t>
             </a:r>
             <a:endParaRPr lang="en-US" dirty="0"/>
@@ -2590,7 +2864,7 @@
             <a:fld id="{B61BEF0D-F0BB-DE4B-95CE-6DB70DBA9567}" type="datetimeFigureOut">
               <a:rPr lang="en-US" dirty="0"/>
               <a:pPr/>
-              <a:t>12/12/17</a:t>
+              <a:t>12/12/2017</a:t>
             </a:fld>
             <a:endParaRPr lang="en-US" dirty="0"/>
           </a:p>
@@ -2685,7 +2959,7 @@
           <a:lstStyle/>
           <a:p>
             <a:r>
-              <a:rPr lang="en-US" smtClean="0"/>
+              <a:rPr lang="en-US"/>
               <a:t>Click to edit Master title style</a:t>
             </a:r>
             <a:endParaRPr lang="en-US" dirty="0"/>
@@ -2714,35 +2988,35 @@
           <a:p>
             <a:pPr lvl="0"/>
             <a:r>
-              <a:rPr lang="en-US" smtClean="0"/>
+              <a:rPr lang="en-US"/>
               <a:t>Click to edit Master text styles</a:t>
             </a:r>
           </a:p>
           <a:p>
             <a:pPr lvl="1"/>
             <a:r>
-              <a:rPr lang="en-US" smtClean="0"/>
+              <a:rPr lang="en-US"/>
               <a:t>Second level</a:t>
             </a:r>
           </a:p>
           <a:p>
             <a:pPr lvl="2"/>
             <a:r>
-              <a:rPr lang="en-US" smtClean="0"/>
+              <a:rPr lang="en-US"/>
               <a:t>Third level</a:t>
             </a:r>
           </a:p>
           <a:p>
             <a:pPr lvl="3"/>
             <a:r>
-              <a:rPr lang="en-US" smtClean="0"/>
+              <a:rPr lang="en-US"/>
               <a:t>Fourth level</a:t>
             </a:r>
           </a:p>
           <a:p>
             <a:pPr lvl="4"/>
             <a:r>
-              <a:rPr lang="en-US" smtClean="0"/>
+              <a:rPr lang="en-US"/>
               <a:t>Fifth level</a:t>
             </a:r>
             <a:endParaRPr lang="en-US" dirty="0"/>
@@ -2767,7 +3041,7 @@
             <a:fld id="{B61BEF0D-F0BB-DE4B-95CE-6DB70DBA9567}" type="datetimeFigureOut">
               <a:rPr lang="en-US" dirty="0"/>
               <a:pPr/>
-              <a:t>12/12/17</a:t>
+              <a:t>12/12/2017</a:t>
             </a:fld>
             <a:endParaRPr lang="en-US" dirty="0"/>
           </a:p>
@@ -2857,7 +3131,7 @@
           <a:lstStyle/>
           <a:p>
             <a:r>
-              <a:rPr lang="en-US" smtClean="0"/>
+              <a:rPr lang="en-US"/>
               <a:t>Click to edit Master title style</a:t>
             </a:r>
             <a:endParaRPr lang="en-US" dirty="0"/>
@@ -2881,35 +3155,35 @@
           <a:p>
             <a:pPr lvl="0"/>
             <a:r>
-              <a:rPr lang="en-US" smtClean="0"/>
+              <a:rPr lang="en-US"/>
               <a:t>Click to edit Master text styles</a:t>
             </a:r>
           </a:p>
           <a:p>
             <a:pPr lvl="1"/>
             <a:r>
-              <a:rPr lang="en-US" smtClean="0"/>
+              <a:rPr lang="en-US"/>
               <a:t>Second level</a:t>
             </a:r>
           </a:p>
           <a:p>
             <a:pPr lvl="2"/>
             <a:r>
-              <a:rPr lang="en-US" smtClean="0"/>
+              <a:rPr lang="en-US"/>
               <a:t>Third level</a:t>
             </a:r>
           </a:p>
           <a:p>
             <a:pPr lvl="3"/>
             <a:r>
-              <a:rPr lang="en-US" smtClean="0"/>
+              <a:rPr lang="en-US"/>
               <a:t>Fourth level</a:t>
             </a:r>
           </a:p>
           <a:p>
             <a:pPr lvl="4"/>
             <a:r>
-              <a:rPr lang="en-US" smtClean="0"/>
+              <a:rPr lang="en-US"/>
               <a:t>Fifth level</a:t>
             </a:r>
             <a:endParaRPr lang="en-US" dirty="0"/>
@@ -2934,7 +3208,7 @@
             <a:fld id="{B61BEF0D-F0BB-DE4B-95CE-6DB70DBA9567}" type="datetimeFigureOut">
               <a:rPr lang="en-US" dirty="0"/>
               <a:pPr/>
-              <a:t>12/12/17</a:t>
+              <a:t>12/12/2017</a:t>
             </a:fld>
             <a:endParaRPr lang="en-US" dirty="0"/>
           </a:p>
@@ -3033,7 +3307,7 @@
           </a:lstStyle>
           <a:p>
             <a:r>
-              <a:rPr lang="en-US" smtClean="0"/>
+              <a:rPr lang="en-US"/>
               <a:t>Click to edit Master title style</a:t>
             </a:r>
             <a:endParaRPr lang="en-US" dirty="0"/>
@@ -3164,7 +3438,7 @@
           <a:p>
             <a:pPr lvl="0"/>
             <a:r>
-              <a:rPr lang="en-US" smtClean="0"/>
+              <a:rPr lang="en-US"/>
               <a:t>Click to edit Master text styles</a:t>
             </a:r>
           </a:p>
@@ -3188,7 +3462,7 @@
             <a:fld id="{B61BEF0D-F0BB-DE4B-95CE-6DB70DBA9567}" type="datetimeFigureOut">
               <a:rPr lang="en-US" dirty="0"/>
               <a:pPr/>
-              <a:t>12/12/17</a:t>
+              <a:t>12/12/2017</a:t>
             </a:fld>
             <a:endParaRPr lang="en-US" dirty="0"/>
           </a:p>
@@ -3278,7 +3552,7 @@
           <a:lstStyle/>
           <a:p>
             <a:r>
-              <a:rPr lang="en-US" smtClean="0"/>
+              <a:rPr lang="en-US"/>
               <a:t>Click to edit Master title style</a:t>
             </a:r>
             <a:endParaRPr lang="en-US" dirty="0"/>
@@ -3337,35 +3611,35 @@
           <a:p>
             <a:pPr lvl="0"/>
             <a:r>
-              <a:rPr lang="en-US" smtClean="0"/>
+              <a:rPr lang="en-US"/>
               <a:t>Click to edit Master text styles</a:t>
             </a:r>
           </a:p>
           <a:p>
             <a:pPr lvl="1"/>
             <a:r>
-              <a:rPr lang="en-US" smtClean="0"/>
+              <a:rPr lang="en-US"/>
               <a:t>Second level</a:t>
             </a:r>
           </a:p>
           <a:p>
             <a:pPr lvl="2"/>
             <a:r>
-              <a:rPr lang="en-US" smtClean="0"/>
+              <a:rPr lang="en-US"/>
               <a:t>Third level</a:t>
             </a:r>
           </a:p>
           <a:p>
             <a:pPr lvl="3"/>
             <a:r>
-              <a:rPr lang="en-US" smtClean="0"/>
+              <a:rPr lang="en-US"/>
               <a:t>Fourth level</a:t>
             </a:r>
           </a:p>
           <a:p>
             <a:pPr lvl="4"/>
             <a:r>
-              <a:rPr lang="en-US" smtClean="0"/>
+              <a:rPr lang="en-US"/>
               <a:t>Fifth level</a:t>
             </a:r>
             <a:endParaRPr lang="en-US" dirty="0"/>
@@ -3424,35 +3698,35 @@
           <a:p>
             <a:pPr lvl="0"/>
             <a:r>
-              <a:rPr lang="en-US" smtClean="0"/>
+              <a:rPr lang="en-US"/>
               <a:t>Click to edit Master text styles</a:t>
             </a:r>
           </a:p>
           <a:p>
             <a:pPr lvl="1"/>
             <a:r>
-              <a:rPr lang="en-US" smtClean="0"/>
+              <a:rPr lang="en-US"/>
               <a:t>Second level</a:t>
             </a:r>
           </a:p>
           <a:p>
             <a:pPr lvl="2"/>
             <a:r>
-              <a:rPr lang="en-US" smtClean="0"/>
+              <a:rPr lang="en-US"/>
               <a:t>Third level</a:t>
             </a:r>
           </a:p>
           <a:p>
             <a:pPr lvl="3"/>
             <a:r>
-              <a:rPr lang="en-US" smtClean="0"/>
+              <a:rPr lang="en-US"/>
               <a:t>Fourth level</a:t>
             </a:r>
           </a:p>
           <a:p>
             <a:pPr lvl="4"/>
             <a:r>
-              <a:rPr lang="en-US" smtClean="0"/>
+              <a:rPr lang="en-US"/>
               <a:t>Fifth level</a:t>
             </a:r>
             <a:endParaRPr lang="en-US" dirty="0"/>
@@ -3477,7 +3751,7 @@
             <a:fld id="{B61BEF0D-F0BB-DE4B-95CE-6DB70DBA9567}" type="datetimeFigureOut">
               <a:rPr lang="en-US" dirty="0"/>
               <a:pPr/>
-              <a:t>12/12/17</a:t>
+              <a:t>12/12/2017</a:t>
             </a:fld>
             <a:endParaRPr lang="en-US" dirty="0"/>
           </a:p>
@@ -3571,7 +3845,7 @@
           </a:lstStyle>
           <a:p>
             <a:r>
-              <a:rPr lang="en-US" smtClean="0"/>
+              <a:rPr lang="en-US"/>
               <a:t>Click to edit Master title style</a:t>
             </a:r>
             <a:endParaRPr lang="en-US" dirty="0"/>
@@ -3639,7 +3913,7 @@
           <a:p>
             <a:pPr lvl="0"/>
             <a:r>
-              <a:rPr lang="en-US" smtClean="0"/>
+              <a:rPr lang="en-US"/>
               <a:t>Click to edit Master text styles</a:t>
             </a:r>
           </a:p>
@@ -3697,35 +3971,35 @@
           <a:p>
             <a:pPr lvl="0"/>
             <a:r>
-              <a:rPr lang="en-US" smtClean="0"/>
+              <a:rPr lang="en-US"/>
               <a:t>Click to edit Master text styles</a:t>
             </a:r>
           </a:p>
           <a:p>
             <a:pPr lvl="1"/>
             <a:r>
-              <a:rPr lang="en-US" smtClean="0"/>
+              <a:rPr lang="en-US"/>
               <a:t>Second level</a:t>
             </a:r>
           </a:p>
           <a:p>
             <a:pPr lvl="2"/>
             <a:r>
-              <a:rPr lang="en-US" smtClean="0"/>
+              <a:rPr lang="en-US"/>
               <a:t>Third level</a:t>
             </a:r>
           </a:p>
           <a:p>
             <a:pPr lvl="3"/>
             <a:r>
-              <a:rPr lang="en-US" smtClean="0"/>
+              <a:rPr lang="en-US"/>
               <a:t>Fourth level</a:t>
             </a:r>
           </a:p>
           <a:p>
             <a:pPr lvl="4"/>
             <a:r>
-              <a:rPr lang="en-US" smtClean="0"/>
+              <a:rPr lang="en-US"/>
               <a:t>Fifth level</a:t>
             </a:r>
             <a:endParaRPr lang="en-US" dirty="0"/>
@@ -3793,7 +4067,7 @@
           <a:p>
             <a:pPr lvl="0"/>
             <a:r>
-              <a:rPr lang="en-US" smtClean="0"/>
+              <a:rPr lang="en-US"/>
               <a:t>Click to edit Master text styles</a:t>
             </a:r>
           </a:p>
@@ -3851,35 +4125,35 @@
           <a:p>
             <a:pPr lvl="0"/>
             <a:r>
-              <a:rPr lang="en-US" smtClean="0"/>
+              <a:rPr lang="en-US"/>
               <a:t>Click to edit Master text styles</a:t>
             </a:r>
           </a:p>
           <a:p>
             <a:pPr lvl="1"/>
             <a:r>
-              <a:rPr lang="en-US" smtClean="0"/>
+              <a:rPr lang="en-US"/>
               <a:t>Second level</a:t>
             </a:r>
           </a:p>
           <a:p>
             <a:pPr lvl="2"/>
             <a:r>
-              <a:rPr lang="en-US" smtClean="0"/>
+              <a:rPr lang="en-US"/>
               <a:t>Third level</a:t>
             </a:r>
           </a:p>
           <a:p>
             <a:pPr lvl="3"/>
             <a:r>
-              <a:rPr lang="en-US" smtClean="0"/>
+              <a:rPr lang="en-US"/>
               <a:t>Fourth level</a:t>
             </a:r>
           </a:p>
           <a:p>
             <a:pPr lvl="4"/>
             <a:r>
-              <a:rPr lang="en-US" smtClean="0"/>
+              <a:rPr lang="en-US"/>
               <a:t>Fifth level</a:t>
             </a:r>
             <a:endParaRPr lang="en-US" dirty="0"/>
@@ -3904,7 +4178,7 @@
             <a:fld id="{B61BEF0D-F0BB-DE4B-95CE-6DB70DBA9567}" type="datetimeFigureOut">
               <a:rPr lang="en-US" dirty="0"/>
               <a:pPr/>
-              <a:t>12/12/17</a:t>
+              <a:t>12/12/2017</a:t>
             </a:fld>
             <a:endParaRPr lang="en-US" dirty="0"/>
           </a:p>
@@ -3994,7 +4268,7 @@
           <a:lstStyle/>
           <a:p>
             <a:r>
-              <a:rPr lang="en-US" smtClean="0"/>
+              <a:rPr lang="en-US"/>
               <a:t>Click to edit Master title style</a:t>
             </a:r>
             <a:endParaRPr lang="en-US" dirty="0"/>
@@ -4019,7 +4293,7 @@
             <a:fld id="{B61BEF0D-F0BB-DE4B-95CE-6DB70DBA9567}" type="datetimeFigureOut">
               <a:rPr lang="en-US" dirty="0"/>
               <a:pPr/>
-              <a:t>12/12/17</a:t>
+              <a:t>12/12/2017</a:t>
             </a:fld>
             <a:endParaRPr lang="en-US" dirty="0"/>
           </a:p>
@@ -4111,7 +4385,7 @@
             <a:fld id="{B61BEF0D-F0BB-DE4B-95CE-6DB70DBA9567}" type="datetimeFigureOut">
               <a:rPr lang="en-US" dirty="0"/>
               <a:pPr/>
-              <a:t>12/12/17</a:t>
+              <a:t>12/12/2017</a:t>
             </a:fld>
             <a:endParaRPr lang="en-US" dirty="0"/>
           </a:p>
@@ -4212,7 +4486,7 @@
           </a:lstStyle>
           <a:p>
             <a:r>
-              <a:rPr lang="en-US" smtClean="0"/>
+              <a:rPr lang="en-US"/>
               <a:t>Click to edit Master title style</a:t>
             </a:r>
             <a:endParaRPr lang="en-US" dirty="0"/>
@@ -4271,35 +4545,35 @@
           <a:p>
             <a:pPr lvl="0"/>
             <a:r>
-              <a:rPr lang="en-US" smtClean="0"/>
+              <a:rPr lang="en-US"/>
               <a:t>Click to edit Master text styles</a:t>
             </a:r>
           </a:p>
           <a:p>
             <a:pPr lvl="1"/>
             <a:r>
-              <a:rPr lang="en-US" smtClean="0"/>
+              <a:rPr lang="en-US"/>
               <a:t>Second level</a:t>
             </a:r>
           </a:p>
           <a:p>
             <a:pPr lvl="2"/>
             <a:r>
-              <a:rPr lang="en-US" smtClean="0"/>
+              <a:rPr lang="en-US"/>
               <a:t>Third level</a:t>
             </a:r>
           </a:p>
           <a:p>
             <a:pPr lvl="3"/>
             <a:r>
-              <a:rPr lang="en-US" smtClean="0"/>
+              <a:rPr lang="en-US"/>
               <a:t>Fourth level</a:t>
             </a:r>
           </a:p>
           <a:p>
             <a:pPr lvl="4"/>
             <a:r>
-              <a:rPr lang="en-US" smtClean="0"/>
+              <a:rPr lang="en-US"/>
               <a:t>Fifth level</a:t>
             </a:r>
             <a:endParaRPr lang="en-US" dirty="0"/>
@@ -4367,7 +4641,7 @@
           <a:p>
             <a:pPr lvl="0"/>
             <a:r>
-              <a:rPr lang="en-US" smtClean="0"/>
+              <a:rPr lang="en-US"/>
               <a:t>Click to edit Master text styles</a:t>
             </a:r>
           </a:p>
@@ -4391,7 +4665,7 @@
             <a:fld id="{B61BEF0D-F0BB-DE4B-95CE-6DB70DBA9567}" type="datetimeFigureOut">
               <a:rPr lang="en-US" dirty="0"/>
               <a:pPr/>
-              <a:t>12/12/17</a:t>
+              <a:t>12/12/2017</a:t>
             </a:fld>
             <a:endParaRPr lang="en-US" dirty="0"/>
           </a:p>
@@ -4492,7 +4766,7 @@
           </a:lstStyle>
           <a:p>
             <a:r>
-              <a:rPr lang="en-US" smtClean="0"/>
+              <a:rPr lang="en-US"/>
               <a:t>Click to edit Master title style</a:t>
             </a:r>
             <a:endParaRPr lang="en-US" dirty="0"/>
@@ -4582,7 +4856,7 @@
           </a:lstStyle>
           <a:p>
             <a:r>
-              <a:rPr lang="en-US" smtClean="0"/>
+              <a:rPr lang="en-US"/>
               <a:t>Drag picture to placeholder or click icon to add</a:t>
             </a:r>
             <a:endParaRPr lang="en-US" dirty="0"/>
@@ -4650,7 +4924,7 @@
           <a:p>
             <a:pPr lvl="0"/>
             <a:r>
-              <a:rPr lang="en-US" smtClean="0"/>
+              <a:rPr lang="en-US"/>
               <a:t>Click to edit Master text styles</a:t>
             </a:r>
           </a:p>
@@ -4679,7 +4953,7 @@
             <a:fld id="{B61BEF0D-F0BB-DE4B-95CE-6DB70DBA9567}" type="datetimeFigureOut">
               <a:rPr lang="en-US" dirty="0"/>
               <a:pPr/>
-              <a:t>12/12/17</a:t>
+              <a:t>12/12/2017</a:t>
             </a:fld>
             <a:endParaRPr lang="en-US" dirty="0"/>
           </a:p>
@@ -4794,7 +5068,7 @@
           <a:lstStyle/>
           <a:p>
             <a:r>
-              <a:rPr lang="en-US" smtClean="0"/>
+              <a:rPr lang="en-US"/>
               <a:t>Click to edit Master title style</a:t>
             </a:r>
             <a:endParaRPr lang="en-US" dirty="0"/>
@@ -4828,35 +5102,35 @@
           <a:p>
             <a:pPr lvl="0"/>
             <a:r>
-              <a:rPr lang="en-US" smtClean="0"/>
+              <a:rPr lang="en-US"/>
               <a:t>Click to edit Master text styles</a:t>
             </a:r>
           </a:p>
           <a:p>
             <a:pPr lvl="1"/>
             <a:r>
-              <a:rPr lang="en-US" smtClean="0"/>
+              <a:rPr lang="en-US"/>
               <a:t>Second level</a:t>
             </a:r>
           </a:p>
           <a:p>
             <a:pPr lvl="2"/>
             <a:r>
-              <a:rPr lang="en-US" smtClean="0"/>
+              <a:rPr lang="en-US"/>
               <a:t>Third level</a:t>
             </a:r>
           </a:p>
           <a:p>
             <a:pPr lvl="3"/>
             <a:r>
-              <a:rPr lang="en-US" smtClean="0"/>
+              <a:rPr lang="en-US"/>
               <a:t>Fourth level</a:t>
             </a:r>
           </a:p>
           <a:p>
             <a:pPr lvl="4"/>
             <a:r>
-              <a:rPr lang="en-US" smtClean="0"/>
+              <a:rPr lang="en-US"/>
               <a:t>Fifth level</a:t>
             </a:r>
             <a:endParaRPr lang="en-US" dirty="0"/>
@@ -4907,7 +5181,7 @@
             <a:fld id="{B61BEF0D-F0BB-DE4B-95CE-6DB70DBA9567}" type="datetimeFigureOut">
               <a:rPr lang="en-US" dirty="0"/>
               <a:pPr/>
-              <a:t>12/12/17</a:t>
+              <a:t>12/12/2017</a:t>
             </a:fld>
             <a:endParaRPr lang="en-US" dirty="0"/>
           </a:p>
@@ -5693,10 +5967,9 @@
           <a:lstStyle/>
           <a:p>
             <a:r>
-              <a:rPr lang="en-US" dirty="0" smtClean="0"/>
+              <a:rPr lang="en-US" dirty="0"/>
               <a:t>RECOMMENDATION SYSTEM YELP DATASET</a:t>
             </a:r>
-            <a:endParaRPr lang="en-US" dirty="0"/>
           </a:p>
         </p:txBody>
       </p:sp>
@@ -5722,17 +5995,16 @@
           <a:p>
             <a:pPr algn="r"/>
             <a:r>
-              <a:rPr lang="en-US" dirty="0" smtClean="0"/>
+              <a:rPr lang="en-US" dirty="0"/>
               <a:t>- VARUN NANDU, ADITYA PRIYADARSHI, XINGXING LIU,</a:t>
             </a:r>
           </a:p>
           <a:p>
             <a:pPr algn="r"/>
             <a:r>
-              <a:rPr lang="en-US" dirty="0" smtClean="0"/>
+              <a:rPr lang="en-US" dirty="0"/>
               <a:t>ABHAY KASTURIA AND GAUTAM VASHISHT</a:t>
             </a:r>
-            <a:endParaRPr lang="en-US" dirty="0"/>
           </a:p>
         </p:txBody>
       </p:sp>
@@ -5746,13 +6018,610 @@
   <p:clrMapOvr>
     <a:masterClrMapping/>
   </p:clrMapOvr>
-  <p:timing>
-    <p:tnLst>
-      <p:par>
-        <p:cTn id="1" dur="indefinite" restart="never" nodeType="tmRoot"/>
-      </p:par>
-    </p:tnLst>
-  </p:timing>
+</p:sld>
+</file>
+
+<file path=ppt/slides/slide10.xml><?xml version="1.0" encoding="utf-8"?>
+<p:sld xmlns:a="http://schemas.openxmlformats.org/drawingml/2006/main" xmlns:r="http://schemas.openxmlformats.org/officeDocument/2006/relationships" xmlns:p="http://schemas.openxmlformats.org/presentationml/2006/main">
+  <p:cSld>
+    <p:spTree>
+      <p:nvGrpSpPr>
+        <p:cNvPr id="1" name=""/>
+        <p:cNvGrpSpPr/>
+        <p:nvPr/>
+      </p:nvGrpSpPr>
+      <p:grpSpPr>
+        <a:xfrm>
+          <a:off x="0" y="0"/>
+          <a:ext cx="0" cy="0"/>
+          <a:chOff x="0" y="0"/>
+          <a:chExt cx="0" cy="0"/>
+        </a:xfrm>
+      </p:grpSpPr>
+      <p:sp>
+        <p:nvSpPr>
+          <p:cNvPr id="2" name="Title 1"/>
+          <p:cNvSpPr>
+            <a:spLocks noGrp="1"/>
+          </p:cNvSpPr>
+          <p:nvPr>
+            <p:ph type="title"/>
+          </p:nvPr>
+        </p:nvSpPr>
+        <p:spPr/>
+        <p:txBody>
+          <a:bodyPr/>
+          <a:lstStyle/>
+          <a:p>
+            <a:r>
+              <a:rPr lang="en-US" dirty="0"/>
+              <a:t>Recommend businesses</a:t>
+            </a:r>
+          </a:p>
+        </p:txBody>
+      </p:sp>
+      <p:sp>
+        <p:nvSpPr>
+          <p:cNvPr id="3" name="Content Placeholder 2"/>
+          <p:cNvSpPr>
+            <a:spLocks noGrp="1"/>
+          </p:cNvSpPr>
+          <p:nvPr>
+            <p:ph idx="1"/>
+          </p:nvPr>
+        </p:nvSpPr>
+        <p:spPr/>
+        <p:txBody>
+          <a:bodyPr/>
+          <a:lstStyle/>
+          <a:p>
+            <a:r>
+              <a:rPr lang="en-US" dirty="0"/>
+              <a:t>Calculate average preference vector</a:t>
+            </a:r>
+          </a:p>
+          <a:p>
+            <a:r>
+              <a:rPr lang="en-US" dirty="0"/>
+              <a:t>Calculate dot product with each business vector</a:t>
+            </a:r>
+          </a:p>
+          <a:p>
+            <a:r>
+              <a:rPr lang="en-US" dirty="0"/>
+              <a:t>Sort the businesses based on decreasing value of the above dot product</a:t>
+            </a:r>
+          </a:p>
+          <a:p>
+            <a:r>
+              <a:rPr lang="en-US" dirty="0"/>
+              <a:t>Take out first 20 businesses as your top recommendations</a:t>
+            </a:r>
+          </a:p>
+        </p:txBody>
+      </p:sp>
+    </p:spTree>
+    <p:extLst>
+      <p:ext uri="{BB962C8B-B14F-4D97-AF65-F5344CB8AC3E}">
+        <p14:creationId xmlns:p14="http://schemas.microsoft.com/office/powerpoint/2010/main" val="1445313786"/>
+      </p:ext>
+    </p:extLst>
+  </p:cSld>
+  <p:clrMapOvr>
+    <a:masterClrMapping/>
+  </p:clrMapOvr>
+</p:sld>
+</file>
+
+<file path=ppt/slides/slide11.xml><?xml version="1.0" encoding="utf-8"?>
+<p:sld xmlns:a="http://schemas.openxmlformats.org/drawingml/2006/main" xmlns:r="http://schemas.openxmlformats.org/officeDocument/2006/relationships" xmlns:p="http://schemas.openxmlformats.org/presentationml/2006/main">
+  <p:cSld>
+    <p:spTree>
+      <p:nvGrpSpPr>
+        <p:cNvPr id="1" name=""/>
+        <p:cNvGrpSpPr/>
+        <p:nvPr/>
+      </p:nvGrpSpPr>
+      <p:grpSpPr>
+        <a:xfrm>
+          <a:off x="0" y="0"/>
+          <a:ext cx="0" cy="0"/>
+          <a:chOff x="0" y="0"/>
+          <a:chExt cx="0" cy="0"/>
+        </a:xfrm>
+      </p:grpSpPr>
+      <p:sp>
+        <p:nvSpPr>
+          <p:cNvPr id="2" name="Title 1"/>
+          <p:cNvSpPr>
+            <a:spLocks noGrp="1"/>
+          </p:cNvSpPr>
+          <p:nvPr>
+            <p:ph type="title"/>
+          </p:nvPr>
+        </p:nvSpPr>
+        <p:spPr/>
+        <p:txBody>
+          <a:bodyPr/>
+          <a:lstStyle/>
+          <a:p>
+            <a:r>
+              <a:rPr lang="en-US" dirty="0"/>
+              <a:t>Evaluation and results of clustering based recommendation</a:t>
+            </a:r>
+          </a:p>
+        </p:txBody>
+      </p:sp>
+      <p:sp>
+        <p:nvSpPr>
+          <p:cNvPr id="4" name="Content Placeholder 3"/>
+          <p:cNvSpPr>
+            <a:spLocks noGrp="1"/>
+          </p:cNvSpPr>
+          <p:nvPr>
+            <p:ph sz="half" idx="1"/>
+          </p:nvPr>
+        </p:nvSpPr>
+        <p:spPr/>
+        <p:txBody>
+          <a:bodyPr/>
+          <a:lstStyle/>
+          <a:p>
+            <a:r>
+              <a:rPr lang="en-US" dirty="0"/>
+              <a:t>Hit ratio</a:t>
+            </a:r>
+          </a:p>
+          <a:p>
+            <a:r>
+              <a:rPr lang="en-US" dirty="0"/>
+              <a:t>Normalized discounted cumulative gain (NDCG)</a:t>
+            </a:r>
+          </a:p>
+        </p:txBody>
+      </p:sp>
+      <p:pic>
+        <p:nvPicPr>
+          <p:cNvPr id="6" name="Content Placeholder 5"/>
+          <p:cNvPicPr>
+            <a:picLocks noGrp="1" noChangeAspect="1"/>
+          </p:cNvPicPr>
+          <p:nvPr>
+            <p:ph sz="half" idx="2"/>
+          </p:nvPr>
+        </p:nvPicPr>
+        <p:blipFill>
+          <a:blip r:embed="rId2">
+            <a:extLst>
+              <a:ext uri="{28A0092B-C50C-407E-A947-70E740481C1C}">
+                <a14:useLocalDpi xmlns:a14="http://schemas.microsoft.com/office/drawing/2010/main" val="0"/>
+              </a:ext>
+            </a:extLst>
+          </a:blip>
+          <a:stretch>
+            <a:fillRect/>
+          </a:stretch>
+        </p:blipFill>
+        <p:spPr>
+          <a:xfrm>
+            <a:off x="6672263" y="1791233"/>
+            <a:ext cx="3471862" cy="4370177"/>
+          </a:xfrm>
+        </p:spPr>
+      </p:pic>
+    </p:spTree>
+    <p:extLst>
+      <p:ext uri="{BB962C8B-B14F-4D97-AF65-F5344CB8AC3E}">
+        <p14:creationId xmlns:p14="http://schemas.microsoft.com/office/powerpoint/2010/main" val="1189300681"/>
+      </p:ext>
+    </p:extLst>
+  </p:cSld>
+  <p:clrMapOvr>
+    <a:masterClrMapping/>
+  </p:clrMapOvr>
+</p:sld>
+</file>
+
+<file path=ppt/slides/slide12.xml><?xml version="1.0" encoding="utf-8"?>
+<p:sld xmlns:a="http://schemas.openxmlformats.org/drawingml/2006/main" xmlns:r="http://schemas.openxmlformats.org/officeDocument/2006/relationships" xmlns:p="http://schemas.openxmlformats.org/presentationml/2006/main">
+  <p:cSld>
+    <p:spTree>
+      <p:nvGrpSpPr>
+        <p:cNvPr id="1" name=""/>
+        <p:cNvGrpSpPr/>
+        <p:nvPr/>
+      </p:nvGrpSpPr>
+      <p:grpSpPr>
+        <a:xfrm>
+          <a:off x="0" y="0"/>
+          <a:ext cx="0" cy="0"/>
+          <a:chOff x="0" y="0"/>
+          <a:chExt cx="0" cy="0"/>
+        </a:xfrm>
+      </p:grpSpPr>
+      <p:sp>
+        <p:nvSpPr>
+          <p:cNvPr id="2" name="Title 1">
+            <a:extLst>
+              <a:ext uri="{FF2B5EF4-FFF2-40B4-BE49-F238E27FC236}">
+                <a16:creationId xmlns:a16="http://schemas.microsoft.com/office/drawing/2014/main" id="{B5B988DD-3CEA-4306-9333-C8B9309F3C73}"/>
+              </a:ext>
+            </a:extLst>
+          </p:cNvPr>
+          <p:cNvSpPr>
+            <a:spLocks noGrp="1"/>
+          </p:cNvSpPr>
+          <p:nvPr>
+            <p:ph type="title"/>
+          </p:nvPr>
+        </p:nvSpPr>
+        <p:spPr/>
+        <p:txBody>
+          <a:bodyPr/>
+          <a:lstStyle/>
+          <a:p>
+            <a:r>
+              <a:rPr lang="en-IN" dirty="0"/>
+              <a:t>Deep Learning based approach</a:t>
+            </a:r>
+          </a:p>
+        </p:txBody>
+      </p:sp>
+      <p:sp>
+        <p:nvSpPr>
+          <p:cNvPr id="3" name="Content Placeholder 2">
+            <a:extLst>
+              <a:ext uri="{FF2B5EF4-FFF2-40B4-BE49-F238E27FC236}">
+                <a16:creationId xmlns:a16="http://schemas.microsoft.com/office/drawing/2014/main" id="{E629C9F5-B61D-4EEA-ABF2-D845038A52CF}"/>
+              </a:ext>
+            </a:extLst>
+          </p:cNvPr>
+          <p:cNvSpPr>
+            <a:spLocks noGrp="1"/>
+          </p:cNvSpPr>
+          <p:nvPr>
+            <p:ph sz="half" idx="1"/>
+          </p:nvPr>
+        </p:nvSpPr>
+        <p:spPr>
+          <a:xfrm>
+            <a:off x="1141412" y="2666999"/>
+            <a:ext cx="9990876" cy="3124201"/>
+          </a:xfrm>
+        </p:spPr>
+        <p:txBody>
+          <a:bodyPr/>
+          <a:lstStyle/>
+          <a:p>
+            <a:r>
+              <a:rPr lang="en-IN" dirty="0"/>
+              <a:t>Uses multi-layer perceptron (MLP) to learn user-item interaction</a:t>
+            </a:r>
+          </a:p>
+          <a:p>
+            <a:r>
+              <a:rPr lang="en-IN" dirty="0"/>
+              <a:t>Uses implicit feedback rather than explicit reviews</a:t>
+            </a:r>
+          </a:p>
+          <a:p>
+            <a:endParaRPr lang="en-IN" dirty="0"/>
+          </a:p>
+        </p:txBody>
+      </p:sp>
+      <p:pic>
+        <p:nvPicPr>
+          <p:cNvPr id="6" name="Picture 5">
+            <a:extLst>
+              <a:ext uri="{FF2B5EF4-FFF2-40B4-BE49-F238E27FC236}">
+                <a16:creationId xmlns:a16="http://schemas.microsoft.com/office/drawing/2014/main" id="{F4F9CB59-64AC-4445-AEB9-F9F8ADE9EAFC}"/>
+              </a:ext>
+            </a:extLst>
+          </p:cNvPr>
+          <p:cNvPicPr>
+            <a:picLocks noChangeAspect="1"/>
+          </p:cNvPicPr>
+          <p:nvPr/>
+        </p:nvPicPr>
+        <p:blipFill>
+          <a:blip r:embed="rId2"/>
+          <a:stretch>
+            <a:fillRect/>
+          </a:stretch>
+        </p:blipFill>
+        <p:spPr>
+          <a:xfrm>
+            <a:off x="2349796" y="5124893"/>
+            <a:ext cx="6836734" cy="999460"/>
+          </a:xfrm>
+          <a:prstGeom prst="rect">
+            <a:avLst/>
+          </a:prstGeom>
+        </p:spPr>
+      </p:pic>
+    </p:spTree>
+    <p:extLst>
+      <p:ext uri="{BB962C8B-B14F-4D97-AF65-F5344CB8AC3E}">
+        <p14:creationId xmlns:p14="http://schemas.microsoft.com/office/powerpoint/2010/main" val="1963870073"/>
+      </p:ext>
+    </p:extLst>
+  </p:cSld>
+  <p:clrMapOvr>
+    <a:masterClrMapping/>
+  </p:clrMapOvr>
+</p:sld>
+</file>
+
+<file path=ppt/slides/slide13.xml><?xml version="1.0" encoding="utf-8"?>
+<p:sld xmlns:a="http://schemas.openxmlformats.org/drawingml/2006/main" xmlns:r="http://schemas.openxmlformats.org/officeDocument/2006/relationships" xmlns:p="http://schemas.openxmlformats.org/presentationml/2006/main">
+  <p:cSld>
+    <p:bg>
+      <p:bgPr>
+        <a:blipFill rotWithShape="1">
+          <a:blip r:embed="rId2">
+            <a:duotone>
+              <a:schemeClr val="bg2">
+                <a:shade val="28000"/>
+                <a:satMod val="94000"/>
+                <a:lumMod val="20000"/>
+              </a:schemeClr>
+              <a:schemeClr val="bg2">
+                <a:tint val="94000"/>
+                <a:shade val="84000"/>
+                <a:satMod val="148000"/>
+                <a:lumMod val="114000"/>
+              </a:schemeClr>
+            </a:duotone>
+            <a:extLst/>
+          </a:blip>
+          <a:stretch/>
+        </a:blipFill>
+        <a:effectLst/>
+      </p:bgPr>
+    </p:bg>
+    <p:spTree>
+      <p:nvGrpSpPr>
+        <p:cNvPr id="1" name=""/>
+        <p:cNvGrpSpPr/>
+        <p:nvPr/>
+      </p:nvGrpSpPr>
+      <p:grpSpPr>
+        <a:xfrm>
+          <a:off x="0" y="0"/>
+          <a:ext cx="0" cy="0"/>
+          <a:chOff x="0" y="0"/>
+          <a:chExt cx="0" cy="0"/>
+        </a:xfrm>
+      </p:grpSpPr>
+      <p:pic>
+        <p:nvPicPr>
+          <p:cNvPr id="6" name="Content Placeholder 5" descr="A close up of a map&#10;&#10;Description generated with very high confidence">
+            <a:extLst>
+              <a:ext uri="{FF2B5EF4-FFF2-40B4-BE49-F238E27FC236}">
+                <a16:creationId xmlns:a16="http://schemas.microsoft.com/office/drawing/2014/main" id="{2C3FC618-4A0F-4D6C-B3FB-3EBE29DEEC71}"/>
+              </a:ext>
+            </a:extLst>
+          </p:cNvPr>
+          <p:cNvPicPr>
+            <a:picLocks noGrp="1" noChangeAspect="1"/>
+          </p:cNvPicPr>
+          <p:nvPr>
+            <p:ph sz="half" idx="1"/>
+          </p:nvPr>
+        </p:nvPicPr>
+        <p:blipFill>
+          <a:blip r:embed="rId3"/>
+          <a:stretch>
+            <a:fillRect/>
+          </a:stretch>
+        </p:blipFill>
+        <p:spPr>
+          <a:xfrm>
+            <a:off x="4783612" y="1116021"/>
+            <a:ext cx="6915663" cy="4235842"/>
+          </a:xfrm>
+          <a:prstGeom prst="roundRect">
+            <a:avLst>
+              <a:gd name="adj" fmla="val 3517"/>
+            </a:avLst>
+          </a:prstGeom>
+          <a:ln w="38100">
+            <a:gradFill flip="none" rotWithShape="1">
+              <a:gsLst>
+                <a:gs pos="0">
+                  <a:srgbClr val="363D46"/>
+                </a:gs>
+                <a:gs pos="100000">
+                  <a:srgbClr val="363D46">
+                    <a:lumMod val="75000"/>
+                  </a:srgbClr>
+                </a:gs>
+              </a:gsLst>
+              <a:lin ang="5400000" scaled="0"/>
+              <a:tileRect/>
+            </a:gradFill>
+          </a:ln>
+          <a:effectLst>
+            <a:innerShdw blurRad="57150" dist="38100" dir="14460000">
+              <a:srgbClr val="000000">
+                <a:alpha val="70000"/>
+              </a:srgbClr>
+            </a:innerShdw>
+          </a:effectLst>
+        </p:spPr>
+      </p:pic>
+      <p:sp>
+        <p:nvSpPr>
+          <p:cNvPr id="2" name="Title 1">
+            <a:extLst>
+              <a:ext uri="{FF2B5EF4-FFF2-40B4-BE49-F238E27FC236}">
+                <a16:creationId xmlns:a16="http://schemas.microsoft.com/office/drawing/2014/main" id="{8DDE080F-369D-45F0-AFC1-59F520CB0A99}"/>
+              </a:ext>
+            </a:extLst>
+          </p:cNvPr>
+          <p:cNvSpPr>
+            <a:spLocks noGrp="1"/>
+          </p:cNvSpPr>
+          <p:nvPr>
+            <p:ph type="title"/>
+          </p:nvPr>
+        </p:nvSpPr>
+        <p:spPr>
+          <a:xfrm>
+            <a:off x="296013" y="60252"/>
+            <a:ext cx="3369133" cy="3642851"/>
+          </a:xfrm>
+        </p:spPr>
+        <p:txBody>
+          <a:bodyPr vert="horz" lIns="91440" tIns="45720" rIns="91440" bIns="45720" rtlCol="0" anchor="b">
+            <a:normAutofit/>
+          </a:bodyPr>
+          <a:lstStyle/>
+          <a:p>
+            <a:pPr algn="ctr"/>
+            <a:r>
+              <a:rPr lang="en-US" sz="3400" dirty="0">
+                <a:effectLst>
+                  <a:glow rad="38100">
+                    <a:schemeClr val="bg1">
+                      <a:lumMod val="65000"/>
+                      <a:lumOff val="35000"/>
+                      <a:alpha val="50000"/>
+                    </a:schemeClr>
+                  </a:glow>
+                  <a:outerShdw blurRad="28575" dist="31750" dir="13200000" algn="tl" rotWithShape="0">
+                    <a:srgbClr val="000000">
+                      <a:alpha val="25000"/>
+                    </a:srgbClr>
+                  </a:outerShdw>
+                </a:effectLst>
+              </a:rPr>
+              <a:t>Model architecture</a:t>
+            </a:r>
+          </a:p>
+        </p:txBody>
+      </p:sp>
+    </p:spTree>
+    <p:extLst>
+      <p:ext uri="{BB962C8B-B14F-4D97-AF65-F5344CB8AC3E}">
+        <p14:creationId xmlns:p14="http://schemas.microsoft.com/office/powerpoint/2010/main" val="482401313"/>
+      </p:ext>
+    </p:extLst>
+  </p:cSld>
+  <p:clrMapOvr>
+    <a:masterClrMapping/>
+  </p:clrMapOvr>
+</p:sld>
+</file>
+
+<file path=ppt/slides/slide14.xml><?xml version="1.0" encoding="utf-8"?>
+<p:sld xmlns:a="http://schemas.openxmlformats.org/drawingml/2006/main" xmlns:r="http://schemas.openxmlformats.org/officeDocument/2006/relationships" xmlns:p="http://schemas.openxmlformats.org/presentationml/2006/main">
+  <p:cSld>
+    <p:spTree>
+      <p:nvGrpSpPr>
+        <p:cNvPr id="1" name=""/>
+        <p:cNvGrpSpPr/>
+        <p:nvPr/>
+      </p:nvGrpSpPr>
+      <p:grpSpPr>
+        <a:xfrm>
+          <a:off x="0" y="0"/>
+          <a:ext cx="0" cy="0"/>
+          <a:chOff x="0" y="0"/>
+          <a:chExt cx="0" cy="0"/>
+        </a:xfrm>
+      </p:grpSpPr>
+      <p:sp>
+        <p:nvSpPr>
+          <p:cNvPr id="2" name="Title 1">
+            <a:extLst>
+              <a:ext uri="{FF2B5EF4-FFF2-40B4-BE49-F238E27FC236}">
+                <a16:creationId xmlns:a16="http://schemas.microsoft.com/office/drawing/2014/main" id="{2FD8CD52-7B04-44C1-81F8-F6083BC044BB}"/>
+              </a:ext>
+            </a:extLst>
+          </p:cNvPr>
+          <p:cNvSpPr>
+            <a:spLocks noGrp="1"/>
+          </p:cNvSpPr>
+          <p:nvPr>
+            <p:ph type="title"/>
+          </p:nvPr>
+        </p:nvSpPr>
+        <p:spPr/>
+        <p:txBody>
+          <a:bodyPr/>
+          <a:lstStyle/>
+          <a:p>
+            <a:r>
+              <a:rPr lang="en-IN" dirty="0"/>
+              <a:t>Evaluation (DNN Method)</a:t>
+            </a:r>
+          </a:p>
+        </p:txBody>
+      </p:sp>
+      <p:sp>
+        <p:nvSpPr>
+          <p:cNvPr id="3" name="Content Placeholder 2">
+            <a:extLst>
+              <a:ext uri="{FF2B5EF4-FFF2-40B4-BE49-F238E27FC236}">
+                <a16:creationId xmlns:a16="http://schemas.microsoft.com/office/drawing/2014/main" id="{EF1E5ACD-A634-4E52-9F70-65709F9A6A6A}"/>
+              </a:ext>
+            </a:extLst>
+          </p:cNvPr>
+          <p:cNvSpPr>
+            <a:spLocks noGrp="1"/>
+          </p:cNvSpPr>
+          <p:nvPr>
+            <p:ph sz="half" idx="1"/>
+          </p:nvPr>
+        </p:nvSpPr>
+        <p:spPr>
+          <a:xfrm>
+            <a:off x="1141411" y="2666999"/>
+            <a:ext cx="9905999" cy="3124201"/>
+          </a:xfrm>
+        </p:spPr>
+        <p:txBody>
+          <a:bodyPr/>
+          <a:lstStyle/>
+          <a:p>
+            <a:r>
+              <a:rPr lang="en-IN" dirty="0"/>
+              <a:t>Trained model using 4 hidden layers with [64,32,16,8] factors.</a:t>
+            </a:r>
+          </a:p>
+          <a:p>
+            <a:r>
+              <a:rPr lang="en-IN" dirty="0"/>
+              <a:t>Used hit ratio and </a:t>
+            </a:r>
+            <a:r>
+              <a:rPr lang="en-IN" dirty="0" err="1"/>
+              <a:t>ndcg</a:t>
+            </a:r>
+            <a:r>
+              <a:rPr lang="en-IN" dirty="0"/>
+              <a:t> to measure quality</a:t>
+            </a:r>
+          </a:p>
+          <a:p>
+            <a:r>
+              <a:rPr lang="en-IN" dirty="0"/>
+              <a:t>Best model – hit ratio (0.8197) and NDCG (0.6220)</a:t>
+            </a:r>
+          </a:p>
+        </p:txBody>
+      </p:sp>
+    </p:spTree>
+    <p:extLst>
+      <p:ext uri="{BB962C8B-B14F-4D97-AF65-F5344CB8AC3E}">
+        <p14:creationId xmlns:p14="http://schemas.microsoft.com/office/powerpoint/2010/main" val="3839082217"/>
+      </p:ext>
+    </p:extLst>
+  </p:cSld>
+  <p:clrMapOvr>
+    <a:masterClrMapping/>
+  </p:clrMapOvr>
 </p:sld>
 </file>
 
@@ -5789,10 +6658,9 @@
           <a:lstStyle/>
           <a:p>
             <a:r>
-              <a:rPr lang="en-US" dirty="0" smtClean="0"/>
+              <a:rPr lang="en-US" dirty="0"/>
               <a:t>outline</a:t>
             </a:r>
-            <a:endParaRPr lang="en-US" dirty="0"/>
           </a:p>
         </p:txBody>
       </p:sp>
@@ -5812,40 +6680,39 @@
           <a:lstStyle/>
           <a:p>
             <a:r>
-              <a:rPr lang="en-US" dirty="0" smtClean="0"/>
+              <a:rPr lang="en-US" dirty="0"/>
               <a:t>Introduction</a:t>
             </a:r>
           </a:p>
           <a:p>
             <a:r>
-              <a:rPr lang="en-US" dirty="0" smtClean="0"/>
+              <a:rPr lang="en-US" dirty="0"/>
               <a:t>Dataset used and its preprocessing</a:t>
             </a:r>
           </a:p>
           <a:p>
             <a:r>
-              <a:rPr lang="en-US" dirty="0" smtClean="0"/>
+              <a:rPr lang="en-US" dirty="0"/>
               <a:t>Clustering</a:t>
             </a:r>
           </a:p>
           <a:p>
             <a:r>
-              <a:rPr lang="en-US" dirty="0" smtClean="0"/>
+              <a:rPr lang="en-US" dirty="0"/>
               <a:t>Collaborative filtering</a:t>
             </a:r>
           </a:p>
           <a:p>
             <a:r>
-              <a:rPr lang="en-US" dirty="0" smtClean="0"/>
+              <a:rPr lang="en-US" dirty="0"/>
               <a:t>Multi layer perceptron</a:t>
             </a:r>
           </a:p>
           <a:p>
             <a:r>
-              <a:rPr lang="en-US" dirty="0" smtClean="0"/>
+              <a:rPr lang="en-US" dirty="0"/>
               <a:t>Evaluation and results</a:t>
             </a:r>
-            <a:endParaRPr lang="en-US" dirty="0"/>
           </a:p>
         </p:txBody>
       </p:sp>
@@ -5859,13 +6726,6 @@
   <p:clrMapOvr>
     <a:masterClrMapping/>
   </p:clrMapOvr>
-  <p:timing>
-    <p:tnLst>
-      <p:par>
-        <p:cTn id="1" dur="indefinite" restart="never" nodeType="tmRoot"/>
-      </p:par>
-    </p:tnLst>
-  </p:timing>
 </p:sld>
 </file>
 
@@ -5907,10 +6767,9 @@
           <a:lstStyle/>
           <a:p>
             <a:r>
-              <a:rPr lang="en-US" dirty="0" smtClean="0"/>
+              <a:rPr lang="en-US" dirty="0"/>
               <a:t>introduction</a:t>
             </a:r>
-            <a:endParaRPr lang="en-US" dirty="0"/>
           </a:p>
         </p:txBody>
       </p:sp>
@@ -5983,13 +6842,6 @@
   <p:clrMapOvr>
     <a:masterClrMapping/>
   </p:clrMapOvr>
-  <p:timing>
-    <p:tnLst>
-      <p:par>
-        <p:cTn id="1" dur="indefinite" restart="never" nodeType="tmRoot"/>
-      </p:par>
-    </p:tnLst>
-  </p:timing>
 </p:sld>
 </file>
 
@@ -6026,10 +6878,9 @@
           <a:lstStyle/>
           <a:p>
             <a:r>
-              <a:rPr lang="en-US" dirty="0" smtClean="0"/>
+              <a:rPr lang="en-US" dirty="0"/>
               <a:t>Yelp dataset and its features</a:t>
             </a:r>
-            <a:endParaRPr lang="en-US" dirty="0"/>
           </a:p>
         </p:txBody>
       </p:sp>
@@ -6094,6 +6945,104 @@
       </p:grpSpPr>
       <p:sp>
         <p:nvSpPr>
+          <p:cNvPr id="2" name="Title 1">
+            <a:extLst>
+              <a:ext uri="{FF2B5EF4-FFF2-40B4-BE49-F238E27FC236}">
+                <a16:creationId xmlns:a16="http://schemas.microsoft.com/office/drawing/2014/main" id="{64328DD1-FC2A-4501-991C-B997205E885B}"/>
+              </a:ext>
+            </a:extLst>
+          </p:cNvPr>
+          <p:cNvSpPr>
+            <a:spLocks noGrp="1"/>
+          </p:cNvSpPr>
+          <p:nvPr>
+            <p:ph type="title"/>
+          </p:nvPr>
+        </p:nvSpPr>
+        <p:spPr/>
+        <p:txBody>
+          <a:bodyPr/>
+          <a:lstStyle/>
+          <a:p>
+            <a:r>
+              <a:rPr lang="en-IN" dirty="0"/>
+              <a:t>Data Pre-processing</a:t>
+            </a:r>
+          </a:p>
+        </p:txBody>
+      </p:sp>
+      <p:sp>
+        <p:nvSpPr>
+          <p:cNvPr id="3" name="Content Placeholder 2">
+            <a:extLst>
+              <a:ext uri="{FF2B5EF4-FFF2-40B4-BE49-F238E27FC236}">
+                <a16:creationId xmlns:a16="http://schemas.microsoft.com/office/drawing/2014/main" id="{E5801039-0831-46C3-BBC4-8A94ADD5C881}"/>
+              </a:ext>
+            </a:extLst>
+          </p:cNvPr>
+          <p:cNvSpPr>
+            <a:spLocks noGrp="1"/>
+          </p:cNvSpPr>
+          <p:nvPr>
+            <p:ph idx="1"/>
+          </p:nvPr>
+        </p:nvSpPr>
+        <p:spPr/>
+        <p:txBody>
+          <a:bodyPr/>
+          <a:lstStyle/>
+          <a:p>
+            <a:r>
+              <a:rPr lang="en-IN" dirty="0"/>
+              <a:t>Filter Businesses by category (only restaurant category select) – 48, 349</a:t>
+            </a:r>
+          </a:p>
+          <a:p>
+            <a:r>
+              <a:rPr lang="en-IN" dirty="0"/>
+              <a:t>Filter users by review count (Min Review : 20) – 19, 771</a:t>
+            </a:r>
+          </a:p>
+          <a:p>
+            <a:r>
+              <a:rPr lang="en-IN" dirty="0"/>
+              <a:t>Divide reviews into training and test set – 9,08,436 Training  and 19,771 Test</a:t>
+            </a:r>
+          </a:p>
+        </p:txBody>
+      </p:sp>
+    </p:spTree>
+    <p:extLst>
+      <p:ext uri="{BB962C8B-B14F-4D97-AF65-F5344CB8AC3E}">
+        <p14:creationId xmlns:p14="http://schemas.microsoft.com/office/powerpoint/2010/main" val="1634841487"/>
+      </p:ext>
+    </p:extLst>
+  </p:cSld>
+  <p:clrMapOvr>
+    <a:masterClrMapping/>
+  </p:clrMapOvr>
+</p:sld>
+</file>
+
+<file path=ppt/slides/slide6.xml><?xml version="1.0" encoding="utf-8"?>
+<p:sld xmlns:a="http://schemas.openxmlformats.org/drawingml/2006/main" xmlns:r="http://schemas.openxmlformats.org/officeDocument/2006/relationships" xmlns:p="http://schemas.openxmlformats.org/presentationml/2006/main">
+  <p:cSld>
+    <p:spTree>
+      <p:nvGrpSpPr>
+        <p:cNvPr id="1" name=""/>
+        <p:cNvGrpSpPr/>
+        <p:nvPr/>
+      </p:nvGrpSpPr>
+      <p:grpSpPr>
+        <a:xfrm>
+          <a:off x="0" y="0"/>
+          <a:ext cx="0" cy="0"/>
+          <a:chOff x="0" y="0"/>
+          <a:chExt cx="0" cy="0"/>
+        </a:xfrm>
+      </p:grpSpPr>
+      <p:sp>
+        <p:nvSpPr>
           <p:cNvPr id="5" name="Title 4"/>
           <p:cNvSpPr>
             <a:spLocks noGrp="1"/>
@@ -6102,16 +7051,173 @@
             <p:ph type="title"/>
           </p:nvPr>
         </p:nvSpPr>
-        <p:spPr/>
-        <p:txBody>
-          <a:bodyPr/>
-          <a:lstStyle/>
-          <a:p>
-            <a:r>
-              <a:rPr lang="en-US" dirty="0" smtClean="0"/>
-              <a:t>Dataset Preprocessing</a:t>
-            </a:r>
-            <a:endParaRPr lang="en-US" dirty="0"/>
+        <p:spPr>
+          <a:xfrm>
+            <a:off x="1141413" y="609600"/>
+            <a:ext cx="9905998" cy="1905000"/>
+          </a:xfrm>
+        </p:spPr>
+        <p:txBody>
+          <a:bodyPr/>
+          <a:lstStyle/>
+          <a:p>
+            <a:r>
+              <a:rPr lang="en-US" dirty="0"/>
+              <a:t>Dataset Analysis</a:t>
+            </a:r>
+          </a:p>
+        </p:txBody>
+      </p:sp>
+      <p:sp>
+        <p:nvSpPr>
+          <p:cNvPr id="6" name="Content Placeholder 5"/>
+          <p:cNvSpPr>
+            <a:spLocks noGrp="1"/>
+          </p:cNvSpPr>
+          <p:nvPr>
+            <p:ph idx="1"/>
+          </p:nvPr>
+        </p:nvSpPr>
+        <p:spPr>
+          <a:xfrm>
+            <a:off x="1141413" y="2410044"/>
+            <a:ext cx="6502400" cy="2547939"/>
+          </a:xfrm>
+        </p:spPr>
+        <p:txBody>
+          <a:bodyPr/>
+          <a:lstStyle/>
+          <a:p>
+            <a:r>
+              <a:rPr lang="en-US" dirty="0"/>
+              <a:t>rating per user</a:t>
+            </a:r>
+          </a:p>
+          <a:p>
+            <a:r>
+              <a:rPr lang="en-US" dirty="0"/>
+              <a:t>Review count per user</a:t>
+            </a:r>
+          </a:p>
+          <a:p>
+            <a:endParaRPr lang="en-US" dirty="0"/>
+          </a:p>
+        </p:txBody>
+      </p:sp>
+      <p:pic>
+        <p:nvPicPr>
+          <p:cNvPr id="3" name="Picture 2">
+            <a:extLst>
+              <a:ext uri="{FF2B5EF4-FFF2-40B4-BE49-F238E27FC236}">
+                <a16:creationId xmlns:a16="http://schemas.microsoft.com/office/drawing/2014/main" id="{974A4BF6-6710-4CD5-AEBB-4E04BC431CF3}"/>
+              </a:ext>
+            </a:extLst>
+          </p:cNvPr>
+          <p:cNvPicPr>
+            <a:picLocks noChangeAspect="1"/>
+          </p:cNvPicPr>
+          <p:nvPr/>
+        </p:nvPicPr>
+        <p:blipFill>
+          <a:blip r:embed="rId2"/>
+          <a:stretch>
+            <a:fillRect/>
+          </a:stretch>
+        </p:blipFill>
+        <p:spPr>
+          <a:xfrm>
+            <a:off x="6118797" y="-38278"/>
+            <a:ext cx="6073202" cy="3467278"/>
+          </a:xfrm>
+          <a:prstGeom prst="rect">
+            <a:avLst/>
+          </a:prstGeom>
+        </p:spPr>
+      </p:pic>
+      <p:pic>
+        <p:nvPicPr>
+          <p:cNvPr id="7" name="Picture 6" descr="A screenshot of a cell phone&#10;&#10;Description generated with very high confidence">
+            <a:extLst>
+              <a:ext uri="{FF2B5EF4-FFF2-40B4-BE49-F238E27FC236}">
+                <a16:creationId xmlns:a16="http://schemas.microsoft.com/office/drawing/2014/main" id="{3372DF14-1931-43AA-91BD-59A5B218EB62}"/>
+              </a:ext>
+            </a:extLst>
+          </p:cNvPr>
+          <p:cNvPicPr>
+            <a:picLocks noChangeAspect="1"/>
+          </p:cNvPicPr>
+          <p:nvPr/>
+        </p:nvPicPr>
+        <p:blipFill>
+          <a:blip r:embed="rId3"/>
+          <a:stretch>
+            <a:fillRect/>
+          </a:stretch>
+        </p:blipFill>
+        <p:spPr>
+          <a:xfrm>
+            <a:off x="6118798" y="3365321"/>
+            <a:ext cx="6073202" cy="3492679"/>
+          </a:xfrm>
+          <a:prstGeom prst="rect">
+            <a:avLst/>
+          </a:prstGeom>
+        </p:spPr>
+      </p:pic>
+    </p:spTree>
+    <p:extLst>
+      <p:ext uri="{BB962C8B-B14F-4D97-AF65-F5344CB8AC3E}">
+        <p14:creationId xmlns:p14="http://schemas.microsoft.com/office/powerpoint/2010/main" val="1561574345"/>
+      </p:ext>
+    </p:extLst>
+  </p:cSld>
+  <p:clrMapOvr>
+    <a:masterClrMapping/>
+  </p:clrMapOvr>
+</p:sld>
+</file>
+
+<file path=ppt/slides/slide7.xml><?xml version="1.0" encoding="utf-8"?>
+<p:sld xmlns:a="http://schemas.openxmlformats.org/drawingml/2006/main" xmlns:r="http://schemas.openxmlformats.org/officeDocument/2006/relationships" xmlns:p="http://schemas.openxmlformats.org/presentationml/2006/main">
+  <p:cSld>
+    <p:spTree>
+      <p:nvGrpSpPr>
+        <p:cNvPr id="1" name=""/>
+        <p:cNvGrpSpPr/>
+        <p:nvPr/>
+      </p:nvGrpSpPr>
+      <p:grpSpPr>
+        <a:xfrm>
+          <a:off x="0" y="0"/>
+          <a:ext cx="0" cy="0"/>
+          <a:chOff x="0" y="0"/>
+          <a:chExt cx="0" cy="0"/>
+        </a:xfrm>
+      </p:grpSpPr>
+      <p:sp>
+        <p:nvSpPr>
+          <p:cNvPr id="5" name="Title 4"/>
+          <p:cNvSpPr>
+            <a:spLocks noGrp="1"/>
+          </p:cNvSpPr>
+          <p:nvPr>
+            <p:ph type="title"/>
+          </p:nvPr>
+        </p:nvSpPr>
+        <p:spPr>
+          <a:xfrm>
+            <a:off x="1141413" y="609600"/>
+            <a:ext cx="9905998" cy="1905000"/>
+          </a:xfrm>
+        </p:spPr>
+        <p:txBody>
+          <a:bodyPr/>
+          <a:lstStyle/>
+          <a:p>
+            <a:r>
+              <a:rPr lang="en-US" dirty="0"/>
+              <a:t>Dataset Analysis</a:t>
+            </a:r>
           </a:p>
         </p:txBody>
       </p:sp>
@@ -6136,20 +7242,19 @@
           <a:lstStyle/>
           <a:p>
             <a:r>
-              <a:rPr lang="en-US" dirty="0" smtClean="0"/>
-              <a:t>Division of testing and training data</a:t>
-            </a:r>
-          </a:p>
-          <a:p>
-            <a:r>
-              <a:rPr lang="en-US" dirty="0" smtClean="0"/>
-              <a:t>Top cities</a:t>
-            </a:r>
-          </a:p>
-          <a:p>
-            <a:r>
-              <a:rPr lang="en-US" dirty="0" smtClean="0"/>
-              <a:t>Top businesses</a:t>
+              <a:rPr lang="en-US" dirty="0"/>
+              <a:t>Top category in popular city like las </a:t>
+            </a:r>
+            <a:r>
+              <a:rPr lang="en-US" dirty="0" err="1"/>
+              <a:t>vegas</a:t>
+            </a:r>
+            <a:endParaRPr lang="en-US" dirty="0"/>
+          </a:p>
+          <a:p>
+            <a:r>
+              <a:rPr lang="en-US" dirty="0"/>
+              <a:t>Yelp user growth</a:t>
             </a:r>
           </a:p>
           <a:p>
@@ -6209,7 +7314,7 @@
         </p:blipFill>
         <p:spPr>
           <a:xfrm>
-            <a:off x="6094412" y="3718194"/>
+            <a:off x="6239874" y="3819128"/>
             <a:ext cx="5836823" cy="2791619"/>
           </a:xfrm>
           <a:prstGeom prst="rect">
@@ -6220,260 +7325,7 @@
     </p:spTree>
     <p:extLst>
       <p:ext uri="{BB962C8B-B14F-4D97-AF65-F5344CB8AC3E}">
-        <p14:creationId xmlns:p14="http://schemas.microsoft.com/office/powerpoint/2010/main" val="1561574345"/>
-      </p:ext>
-    </p:extLst>
-  </p:cSld>
-  <p:clrMapOvr>
-    <a:masterClrMapping/>
-  </p:clrMapOvr>
-</p:sld>
-</file>
-
-<file path=ppt/slides/slide6.xml><?xml version="1.0" encoding="utf-8"?>
-<p:sld xmlns:a="http://schemas.openxmlformats.org/drawingml/2006/main" xmlns:r="http://schemas.openxmlformats.org/officeDocument/2006/relationships" xmlns:p="http://schemas.openxmlformats.org/presentationml/2006/main">
-  <p:cSld>
-    <p:spTree>
-      <p:nvGrpSpPr>
-        <p:cNvPr id="1" name=""/>
-        <p:cNvGrpSpPr/>
-        <p:nvPr/>
-      </p:nvGrpSpPr>
-      <p:grpSpPr>
-        <a:xfrm>
-          <a:off x="0" y="0"/>
-          <a:ext cx="0" cy="0"/>
-          <a:chOff x="0" y="0"/>
-          <a:chExt cx="0" cy="0"/>
-        </a:xfrm>
-      </p:grpSpPr>
-      <p:sp>
-        <p:nvSpPr>
-          <p:cNvPr id="2" name="Title 1"/>
-          <p:cNvSpPr>
-            <a:spLocks noGrp="1"/>
-          </p:cNvSpPr>
-          <p:nvPr>
-            <p:ph type="title"/>
-          </p:nvPr>
-        </p:nvSpPr>
-        <p:spPr/>
-        <p:txBody>
-          <a:bodyPr/>
-          <a:lstStyle/>
-          <a:p>
-            <a:r>
-              <a:rPr lang="en-US" dirty="0" smtClean="0"/>
-              <a:t>clustering</a:t>
-            </a:r>
-            <a:endParaRPr lang="en-US" dirty="0"/>
-          </a:p>
-        </p:txBody>
-      </p:sp>
-      <p:sp>
-        <p:nvSpPr>
-          <p:cNvPr id="3" name="Content Placeholder 2"/>
-          <p:cNvSpPr>
-            <a:spLocks noGrp="1"/>
-          </p:cNvSpPr>
-          <p:nvPr>
-            <p:ph idx="1"/>
-          </p:nvPr>
-        </p:nvSpPr>
-        <p:spPr/>
-        <p:txBody>
-          <a:bodyPr/>
-          <a:lstStyle/>
-          <a:p>
-            <a:r>
-              <a:rPr lang="en-US" dirty="0" smtClean="0"/>
-              <a:t>Assumptions </a:t>
-            </a:r>
-            <a:r>
-              <a:rPr lang="mr-IN" dirty="0" smtClean="0"/>
-              <a:t>–</a:t>
-            </a:r>
-            <a:r>
-              <a:rPr lang="en-US" dirty="0" smtClean="0"/>
-              <a:t> </a:t>
-            </a:r>
-            <a:r>
-              <a:rPr lang="en-US" dirty="0" err="1" smtClean="0"/>
-              <a:t>UserID</a:t>
-            </a:r>
-            <a:r>
-              <a:rPr lang="en-US" dirty="0" smtClean="0"/>
-              <a:t>, Location and Type Of Business</a:t>
-            </a:r>
-          </a:p>
-          <a:p>
-            <a:r>
-              <a:rPr lang="en-US" dirty="0" smtClean="0"/>
-              <a:t>User preference vector of top 15 categories based on rating </a:t>
-            </a:r>
-            <a:r>
-              <a:rPr lang="mr-IN" dirty="0" smtClean="0"/>
-              <a:t>–</a:t>
-            </a:r>
-            <a:r>
-              <a:rPr lang="en-US" dirty="0" smtClean="0"/>
-              <a:t> what if no rating?</a:t>
-            </a:r>
-          </a:p>
-          <a:p>
-            <a:r>
-              <a:rPr lang="en-US" dirty="0" smtClean="0"/>
-              <a:t>Business vector </a:t>
-            </a:r>
-            <a:r>
-              <a:rPr lang="mr-IN" dirty="0" smtClean="0"/>
-              <a:t>–</a:t>
-            </a:r>
-            <a:r>
-              <a:rPr lang="en-US" dirty="0" smtClean="0"/>
-              <a:t> must contain 3 of top 15 categories. </a:t>
-            </a:r>
-          </a:p>
-          <a:p>
-            <a:r>
-              <a:rPr lang="en-US" dirty="0" smtClean="0"/>
-              <a:t>Use agglomerative Hierarchical clustering to cluster users</a:t>
-            </a:r>
-          </a:p>
-          <a:p>
-            <a:endParaRPr lang="en-US" dirty="0" smtClean="0"/>
-          </a:p>
-          <a:p>
-            <a:endParaRPr lang="en-US" dirty="0"/>
-          </a:p>
-        </p:txBody>
-      </p:sp>
-    </p:spTree>
-    <p:extLst>
-      <p:ext uri="{BB962C8B-B14F-4D97-AF65-F5344CB8AC3E}">
-        <p14:creationId xmlns:p14="http://schemas.microsoft.com/office/powerpoint/2010/main" val="1217502752"/>
-      </p:ext>
-    </p:extLst>
-  </p:cSld>
-  <p:clrMapOvr>
-    <a:masterClrMapping/>
-  </p:clrMapOvr>
-</p:sld>
-</file>
-
-<file path=ppt/slides/slide7.xml><?xml version="1.0" encoding="utf-8"?>
-<p:sld xmlns:a="http://schemas.openxmlformats.org/drawingml/2006/main" xmlns:r="http://schemas.openxmlformats.org/officeDocument/2006/relationships" xmlns:p="http://schemas.openxmlformats.org/presentationml/2006/main">
-  <p:cSld>
-    <p:spTree>
-      <p:nvGrpSpPr>
-        <p:cNvPr id="1" name=""/>
-        <p:cNvGrpSpPr/>
-        <p:nvPr/>
-      </p:nvGrpSpPr>
-      <p:grpSpPr>
-        <a:xfrm>
-          <a:off x="0" y="0"/>
-          <a:ext cx="0" cy="0"/>
-          <a:chOff x="0" y="0"/>
-          <a:chExt cx="0" cy="0"/>
-        </a:xfrm>
-      </p:grpSpPr>
-      <p:sp>
-        <p:nvSpPr>
-          <p:cNvPr id="2" name="Title 1"/>
-          <p:cNvSpPr>
-            <a:spLocks noGrp="1"/>
-          </p:cNvSpPr>
-          <p:nvPr>
-            <p:ph type="title"/>
-          </p:nvPr>
-        </p:nvSpPr>
-        <p:spPr/>
-        <p:txBody>
-          <a:bodyPr/>
-          <a:lstStyle/>
-          <a:p>
-            <a:r>
-              <a:rPr lang="en-US" dirty="0" smtClean="0"/>
-              <a:t>Agglomerative </a:t>
-            </a:r>
-            <a:r>
-              <a:rPr lang="en-US" dirty="0"/>
-              <a:t>Hierarchical </a:t>
-            </a:r>
-            <a:r>
-              <a:rPr lang="en-US" dirty="0" smtClean="0"/>
-              <a:t>clustering</a:t>
-            </a:r>
-            <a:endParaRPr lang="en-US" dirty="0"/>
-          </a:p>
-        </p:txBody>
-      </p:sp>
-      <p:pic>
-        <p:nvPicPr>
-          <p:cNvPr id="5" name="Content Placeholder 4"/>
-          <p:cNvPicPr>
-            <a:picLocks noGrp="1" noChangeAspect="1"/>
-          </p:cNvPicPr>
-          <p:nvPr>
-            <p:ph idx="1"/>
-          </p:nvPr>
-        </p:nvPicPr>
-        <p:blipFill>
-          <a:blip r:embed="rId2">
-            <a:extLst>
-              <a:ext uri="{28A0092B-C50C-407E-A947-70E740481C1C}">
-                <a14:useLocalDpi xmlns:a14="http://schemas.microsoft.com/office/drawing/2010/main" val="0"/>
-              </a:ext>
-            </a:extLst>
-          </a:blip>
-          <a:stretch>
-            <a:fillRect/>
-          </a:stretch>
-        </p:blipFill>
-        <p:spPr>
-          <a:xfrm>
-            <a:off x="2170360" y="3662631"/>
-            <a:ext cx="7658100" cy="1536700"/>
-          </a:xfrm>
-        </p:spPr>
-      </p:pic>
-      <p:sp>
-        <p:nvSpPr>
-          <p:cNvPr id="7" name="TextBox 6"/>
-          <p:cNvSpPr txBox="1"/>
-          <p:nvPr/>
-        </p:nvSpPr>
-        <p:spPr>
-          <a:xfrm>
-            <a:off x="2042105" y="2223760"/>
-            <a:ext cx="3396793" cy="738664"/>
-          </a:xfrm>
-          <a:prstGeom prst="rect">
-            <a:avLst/>
-          </a:prstGeom>
-          <a:noFill/>
-        </p:spPr>
-        <p:txBody>
-          <a:bodyPr wrap="square" rtlCol="0">
-            <a:spAutoFit/>
-          </a:bodyPr>
-          <a:lstStyle/>
-          <a:p>
-            <a:r>
-              <a:rPr lang="en-US" sz="2400" dirty="0" smtClean="0"/>
-              <a:t>Number Of Clusters?</a:t>
-            </a:r>
-          </a:p>
-          <a:p>
-            <a:endParaRPr lang="en-US" dirty="0"/>
-          </a:p>
-        </p:txBody>
-      </p:sp>
-    </p:spTree>
-    <p:extLst>
-      <p:ext uri="{BB962C8B-B14F-4D97-AF65-F5344CB8AC3E}">
-        <p14:creationId xmlns:p14="http://schemas.microsoft.com/office/powerpoint/2010/main" val="1303766744"/>
+        <p14:creationId xmlns:p14="http://schemas.microsoft.com/office/powerpoint/2010/main" val="1282364818"/>
       </p:ext>
     </p:extLst>
   </p:cSld>
@@ -6516,10 +7368,9 @@
           <a:lstStyle/>
           <a:p>
             <a:r>
-              <a:rPr lang="en-US" dirty="0" smtClean="0"/>
-              <a:t>Recommend businesses</a:t>
-            </a:r>
-            <a:endParaRPr lang="en-US" dirty="0"/>
+              <a:rPr lang="en-US" dirty="0"/>
+              <a:t>clustering</a:t>
+            </a:r>
           </a:p>
         </p:txBody>
       </p:sp>
@@ -6539,27 +7390,64 @@
           <a:lstStyle/>
           <a:p>
             <a:r>
-              <a:rPr lang="en-US" dirty="0" smtClean="0"/>
-              <a:t>Calculate average preference vector</a:t>
-            </a:r>
-          </a:p>
-          <a:p>
-            <a:r>
-              <a:rPr lang="en-US" dirty="0" smtClean="0"/>
-              <a:t>Calculate dot product with each business vector</a:t>
-            </a:r>
-          </a:p>
-          <a:p>
-            <a:r>
-              <a:rPr lang="en-US" dirty="0" smtClean="0"/>
-              <a:t>Sort the businesses based on decreasing value of the above dot product</a:t>
-            </a:r>
-          </a:p>
-          <a:p>
-            <a:r>
-              <a:rPr lang="en-US" dirty="0" smtClean="0"/>
-              <a:t>Take out first 20 businesses as your top recommendations</a:t>
-            </a:r>
+              <a:rPr lang="en-US" dirty="0"/>
+              <a:t>Assumptions </a:t>
+            </a:r>
+            <a:r>
+              <a:rPr lang="mr-IN" dirty="0"/>
+              <a:t>–</a:t>
+            </a:r>
+            <a:r>
+              <a:rPr lang="en-US" dirty="0"/>
+              <a:t> </a:t>
+            </a:r>
+            <a:r>
+              <a:rPr lang="en-US" dirty="0" err="1"/>
+              <a:t>UserID</a:t>
+            </a:r>
+            <a:r>
+              <a:rPr lang="en-US" dirty="0"/>
+              <a:t>, Location and Type Of Business</a:t>
+            </a:r>
+          </a:p>
+          <a:p>
+            <a:r>
+              <a:rPr lang="en-US" dirty="0"/>
+              <a:t>User preference vector of top 15 categories based on rating </a:t>
+            </a:r>
+            <a:r>
+              <a:rPr lang="mr-IN" dirty="0"/>
+              <a:t>–</a:t>
+            </a:r>
+            <a:r>
+              <a:rPr lang="en-US" dirty="0"/>
+              <a:t> what if no rating?</a:t>
+            </a:r>
+          </a:p>
+          <a:p>
+            <a:r>
+              <a:rPr lang="en-US" dirty="0"/>
+              <a:t>Business vector </a:t>
+            </a:r>
+            <a:r>
+              <a:rPr lang="mr-IN" dirty="0"/>
+              <a:t>–</a:t>
+            </a:r>
+            <a:r>
+              <a:rPr lang="en-US" dirty="0"/>
+              <a:t> must contain 3 of top 15 categories. </a:t>
+            </a:r>
+          </a:p>
+          <a:p>
+            <a:r>
+              <a:rPr lang="en-US" dirty="0"/>
+              <a:t>Use agglomerative Hierarchical clustering to cluster users</a:t>
+            </a:r>
+          </a:p>
+          <a:p>
+            <a:endParaRPr lang="en-US" dirty="0"/>
+          </a:p>
+          <a:p>
             <a:endParaRPr lang="en-US" dirty="0"/>
           </a:p>
         </p:txBody>
@@ -6567,7 +7455,7 @@
     </p:spTree>
     <p:extLst>
       <p:ext uri="{BB962C8B-B14F-4D97-AF65-F5344CB8AC3E}">
-        <p14:creationId xmlns:p14="http://schemas.microsoft.com/office/powerpoint/2010/main" val="1445313786"/>
+        <p14:creationId xmlns:p14="http://schemas.microsoft.com/office/powerpoint/2010/main" val="1217502752"/>
       </p:ext>
     </p:extLst>
   </p:cSld>
@@ -6610,49 +7498,20 @@
           <a:lstStyle/>
           <a:p>
             <a:r>
-              <a:rPr lang="en-US" dirty="0" smtClean="0"/>
-              <a:t>Evaluation and results of clustering based recommendation</a:t>
-            </a:r>
-            <a:endParaRPr lang="en-US" dirty="0"/>
-          </a:p>
-        </p:txBody>
-      </p:sp>
-      <p:sp>
-        <p:nvSpPr>
-          <p:cNvPr id="4" name="Content Placeholder 3"/>
-          <p:cNvSpPr>
-            <a:spLocks noGrp="1"/>
-          </p:cNvSpPr>
-          <p:nvPr>
-            <p:ph sz="half" idx="1"/>
-          </p:nvPr>
-        </p:nvSpPr>
-        <p:spPr/>
-        <p:txBody>
-          <a:bodyPr/>
-          <a:lstStyle/>
-          <a:p>
-            <a:r>
-              <a:rPr lang="en-US" dirty="0" smtClean="0"/>
-              <a:t>Hit ratio</a:t>
-            </a:r>
-          </a:p>
-          <a:p>
-            <a:r>
-              <a:rPr lang="en-US" dirty="0" smtClean="0"/>
-              <a:t>Normalized discounted cumulative gain (NDCG)</a:t>
+              <a:rPr lang="en-US" dirty="0"/>
+              <a:t>Agglomerative Hierarchical clustering</a:t>
             </a:r>
           </a:p>
         </p:txBody>
       </p:sp>
       <p:pic>
         <p:nvPicPr>
-          <p:cNvPr id="6" name="Content Placeholder 5"/>
+          <p:cNvPr id="5" name="Content Placeholder 4"/>
           <p:cNvPicPr>
             <a:picLocks noGrp="1" noChangeAspect="1"/>
           </p:cNvPicPr>
           <p:nvPr>
-            <p:ph sz="half" idx="2"/>
+            <p:ph idx="1"/>
           </p:nvPr>
         </p:nvPicPr>
         <p:blipFill>
@@ -6669,15 +7528,47 @@
         </p:blipFill>
         <p:spPr>
           <a:xfrm>
-            <a:off x="6672263" y="1791233"/>
-            <a:ext cx="3471862" cy="4370177"/>
+            <a:off x="2170360" y="3662631"/>
+            <a:ext cx="7658100" cy="1536700"/>
           </a:xfrm>
         </p:spPr>
       </p:pic>
+      <p:sp>
+        <p:nvSpPr>
+          <p:cNvPr id="7" name="TextBox 6"/>
+          <p:cNvSpPr txBox="1"/>
+          <p:nvPr/>
+        </p:nvSpPr>
+        <p:spPr>
+          <a:xfrm>
+            <a:off x="2042105" y="2223760"/>
+            <a:ext cx="3396793" cy="738664"/>
+          </a:xfrm>
+          <a:prstGeom prst="rect">
+            <a:avLst/>
+          </a:prstGeom>
+          <a:noFill/>
+        </p:spPr>
+        <p:txBody>
+          <a:bodyPr wrap="square" rtlCol="0">
+            <a:spAutoFit/>
+          </a:bodyPr>
+          <a:lstStyle/>
+          <a:p>
+            <a:r>
+              <a:rPr lang="en-US" sz="2400" dirty="0"/>
+              <a:t>Number Of Clusters?</a:t>
+            </a:r>
+          </a:p>
+          <a:p>
+            <a:endParaRPr lang="en-US" dirty="0"/>
+          </a:p>
+        </p:txBody>
+      </p:sp>
     </p:spTree>
     <p:extLst>
       <p:ext uri="{BB962C8B-B14F-4D97-AF65-F5344CB8AC3E}">
-        <p14:creationId xmlns:p14="http://schemas.microsoft.com/office/powerpoint/2010/main" val="1189300681"/>
+        <p14:creationId xmlns:p14="http://schemas.microsoft.com/office/powerpoint/2010/main" val="1303766744"/>
       </p:ext>
     </p:extLst>
   </p:cSld>

</xml_diff>